<commit_message>
Some additions to the presentation.
</commit_message>
<xml_diff>
--- a/presentation/TDT4290_FinalPresentasjon.pptx
+++ b/presentation/TDT4290_FinalPresentasjon.pptx
@@ -11,42 +11,39 @@
     <p:sldId id="258" r:id="rId5"/>
     <p:sldId id="279" r:id="rId6"/>
     <p:sldId id="259" r:id="rId7"/>
-    <p:sldId id="260" r:id="rId8"/>
-    <p:sldId id="261" r:id="rId9"/>
-    <p:sldId id="281" r:id="rId10"/>
+    <p:sldId id="281" r:id="rId8"/>
+    <p:sldId id="260" r:id="rId9"/>
+    <p:sldId id="261" r:id="rId10"/>
     <p:sldId id="262" r:id="rId11"/>
     <p:sldId id="266" r:id="rId12"/>
-    <p:sldId id="286" r:id="rId13"/>
-    <p:sldId id="287" r:id="rId14"/>
-    <p:sldId id="271" r:id="rId15"/>
-    <p:sldId id="282" r:id="rId16"/>
-    <p:sldId id="289" r:id="rId17"/>
-    <p:sldId id="290" r:id="rId18"/>
-    <p:sldId id="288" r:id="rId19"/>
-    <p:sldId id="291" r:id="rId20"/>
-    <p:sldId id="297" r:id="rId21"/>
-    <p:sldId id="292" r:id="rId22"/>
-    <p:sldId id="283" r:id="rId23"/>
-    <p:sldId id="295" r:id="rId24"/>
-    <p:sldId id="293" r:id="rId25"/>
-    <p:sldId id="294" r:id="rId26"/>
-    <p:sldId id="296" r:id="rId27"/>
-    <p:sldId id="284" r:id="rId28"/>
-    <p:sldId id="298" r:id="rId29"/>
-    <p:sldId id="300" r:id="rId30"/>
-    <p:sldId id="301" r:id="rId31"/>
-    <p:sldId id="285" r:id="rId32"/>
-    <p:sldId id="299" r:id="rId33"/>
-    <p:sldId id="267" r:id="rId34"/>
-    <p:sldId id="268" r:id="rId35"/>
-    <p:sldId id="269" r:id="rId36"/>
-    <p:sldId id="272" r:id="rId37"/>
-    <p:sldId id="273" r:id="rId38"/>
-    <p:sldId id="274" r:id="rId39"/>
-    <p:sldId id="275" r:id="rId40"/>
-    <p:sldId id="276" r:id="rId41"/>
-    <p:sldId id="277" r:id="rId42"/>
-    <p:sldId id="263" r:id="rId43"/>
+    <p:sldId id="282" r:id="rId13"/>
+    <p:sldId id="289" r:id="rId14"/>
+    <p:sldId id="290" r:id="rId15"/>
+    <p:sldId id="288" r:id="rId16"/>
+    <p:sldId id="291" r:id="rId17"/>
+    <p:sldId id="297" r:id="rId18"/>
+    <p:sldId id="292" r:id="rId19"/>
+    <p:sldId id="283" r:id="rId20"/>
+    <p:sldId id="295" r:id="rId21"/>
+    <p:sldId id="293" r:id="rId22"/>
+    <p:sldId id="294" r:id="rId23"/>
+    <p:sldId id="296" r:id="rId24"/>
+    <p:sldId id="284" r:id="rId25"/>
+    <p:sldId id="298" r:id="rId26"/>
+    <p:sldId id="300" r:id="rId27"/>
+    <p:sldId id="301" r:id="rId28"/>
+    <p:sldId id="285" r:id="rId29"/>
+    <p:sldId id="299" r:id="rId30"/>
+    <p:sldId id="267" r:id="rId31"/>
+    <p:sldId id="268" r:id="rId32"/>
+    <p:sldId id="269" r:id="rId33"/>
+    <p:sldId id="272" r:id="rId34"/>
+    <p:sldId id="273" r:id="rId35"/>
+    <p:sldId id="274" r:id="rId36"/>
+    <p:sldId id="275" r:id="rId37"/>
+    <p:sldId id="276" r:id="rId38"/>
+    <p:sldId id="277" r:id="rId39"/>
+    <p:sldId id="263" r:id="rId40"/>
   </p:sldIdLst>
   <p:sldSz cx="9144000" cy="6858000" type="screen4x3"/>
   <p:notesSz cx="6858000" cy="9144000"/>
@@ -432,7 +429,7 @@
             <a:fld id="{651A0C47-018D-4460-B945-BFF7981B6CA6}" type="datetimeFigureOut">
               <a:rPr lang="en-US" smtClean="0"/>
               <a:pPr/>
-              <a:t>11/20/2011</a:t>
+              <a:t>21.11.11</a:t>
             </a:fld>
             <a:endParaRPr lang="en-US"/>
           </a:p>
@@ -626,7 +623,7 @@
             <a:fld id="{EFF1E1C4-020C-3C49-82E1-601ABE71F045}" type="datetimeFigureOut">
               <a:rPr lang="nb-NO" smtClean="0"/>
               <a:pPr/>
-              <a:t>20.11.2011</a:t>
+              <a:t>21.11.11</a:t>
             </a:fld>
             <a:endParaRPr lang="nb-NO"/>
           </a:p>
@@ -897,7 +894,7 @@
             <a:fld id="{EFF1E1C4-020C-3C49-82E1-601ABE71F045}" type="datetimeFigureOut">
               <a:rPr lang="nb-NO" smtClean="0"/>
               <a:pPr/>
-              <a:t>20.11.2011</a:t>
+              <a:t>21.11.11</a:t>
             </a:fld>
             <a:endParaRPr lang="nb-NO"/>
           </a:p>
@@ -1078,7 +1075,7 @@
             <a:fld id="{EFF1E1C4-020C-3C49-82E1-601ABE71F045}" type="datetimeFigureOut">
               <a:rPr lang="nb-NO" smtClean="0"/>
               <a:pPr/>
-              <a:t>20.11.2011</a:t>
+              <a:t>21.11.11</a:t>
             </a:fld>
             <a:endParaRPr lang="nb-NO"/>
           </a:p>
@@ -1249,7 +1246,7 @@
             <a:fld id="{EFF1E1C4-020C-3C49-82E1-601ABE71F045}" type="datetimeFigureOut">
               <a:rPr lang="nb-NO" smtClean="0"/>
               <a:pPr/>
-              <a:t>20.11.2011</a:t>
+              <a:t>21.11.11</a:t>
             </a:fld>
             <a:endParaRPr lang="nb-NO"/>
           </a:p>
@@ -1493,7 +1490,7 @@
             <a:fld id="{EFF1E1C4-020C-3C49-82E1-601ABE71F045}" type="datetimeFigureOut">
               <a:rPr lang="nb-NO" smtClean="0"/>
               <a:pPr/>
-              <a:t>20.11.2011</a:t>
+              <a:t>21.11.11</a:t>
             </a:fld>
             <a:endParaRPr lang="nb-NO"/>
           </a:p>
@@ -1818,7 +1815,7 @@
             <a:fld id="{651A0C47-018D-4460-B945-BFF7981B6CA6}" type="datetimeFigureOut">
               <a:rPr lang="en-US" smtClean="0"/>
               <a:pPr/>
-              <a:t>11/20/2011</a:t>
+              <a:t>21.11.11</a:t>
             </a:fld>
             <a:endParaRPr lang="en-US"/>
           </a:p>
@@ -2118,7 +2115,7 @@
             <a:fld id="{EFF1E1C4-020C-3C49-82E1-601ABE71F045}" type="datetimeFigureOut">
               <a:rPr lang="nb-NO" smtClean="0"/>
               <a:pPr/>
-              <a:t>20.11.2011</a:t>
+              <a:t>21.11.11</a:t>
             </a:fld>
             <a:endParaRPr lang="nb-NO"/>
           </a:p>
@@ -2576,7 +2573,7 @@
             <a:fld id="{EFF1E1C4-020C-3C49-82E1-601ABE71F045}" type="datetimeFigureOut">
               <a:rPr lang="nb-NO" smtClean="0"/>
               <a:pPr/>
-              <a:t>20.11.2011</a:t>
+              <a:t>21.11.11</a:t>
             </a:fld>
             <a:endParaRPr lang="nb-NO"/>
           </a:p>
@@ -2691,7 +2688,7 @@
             <a:fld id="{EFF1E1C4-020C-3C49-82E1-601ABE71F045}" type="datetimeFigureOut">
               <a:rPr lang="nb-NO" smtClean="0"/>
               <a:pPr/>
-              <a:t>20.11.2011</a:t>
+              <a:t>21.11.11</a:t>
             </a:fld>
             <a:endParaRPr lang="nb-NO"/>
           </a:p>
@@ -2783,7 +2780,7 @@
             <a:fld id="{EFF1E1C4-020C-3C49-82E1-601ABE71F045}" type="datetimeFigureOut">
               <a:rPr lang="nb-NO" smtClean="0"/>
               <a:pPr/>
-              <a:t>20.11.2011</a:t>
+              <a:t>21.11.11</a:t>
             </a:fld>
             <a:endParaRPr lang="nb-NO"/>
           </a:p>
@@ -3067,7 +3064,7 @@
             <a:fld id="{EFF1E1C4-020C-3C49-82E1-601ABE71F045}" type="datetimeFigureOut">
               <a:rPr lang="nb-NO" smtClean="0"/>
               <a:pPr/>
-              <a:t>20.11.2011</a:t>
+              <a:t>21.11.11</a:t>
             </a:fld>
             <a:endParaRPr lang="nb-NO"/>
           </a:p>
@@ -3275,7 +3272,7 @@
             <a:fld id="{EFF1E1C4-020C-3C49-82E1-601ABE71F045}" type="datetimeFigureOut">
               <a:rPr lang="nb-NO" smtClean="0"/>
               <a:pPr/>
-              <a:t>20.11.2011</a:t>
+              <a:t>21.11.11</a:t>
             </a:fld>
             <a:endParaRPr lang="nb-NO"/>
           </a:p>
@@ -3810,13 +3807,13 @@
   <p:clrMapOvr>
     <a:masterClrMapping/>
   </p:clrMapOvr>
-  <p:transition spd="slow">
+  <p:transition xmlns:p14="http://schemas.microsoft.com/office/powerpoint/2010/main" spd="slow">
     <p:push dir="u"/>
   </p:transition>
   <p:timing>
     <p:tnLst>
       <p:par>
-        <p:cTn id="1" dur="indefinite" restart="never" nodeType="tmRoot"/>
+        <p:cTn xmlns:p14="http://schemas.microsoft.com/office/powerpoint/2010/main" id="1" dur="indefinite" restart="never" nodeType="tmRoot"/>
       </p:par>
     </p:tnLst>
   </p:timing>
@@ -3959,13 +3956,13 @@
   <p:clrMapOvr>
     <a:masterClrMapping/>
   </p:clrMapOvr>
-  <p:transition spd="slow">
+  <p:transition xmlns:p14="http://schemas.microsoft.com/office/powerpoint/2010/main" spd="slow">
     <p:push dir="u"/>
   </p:transition>
   <p:timing>
     <p:tnLst>
       <p:par>
-        <p:cTn id="1" dur="indefinite" restart="never" nodeType="tmRoot"/>
+        <p:cTn xmlns:p14="http://schemas.microsoft.com/office/powerpoint/2010/main" id="1" dur="indefinite" restart="never" nodeType="tmRoot"/>
       </p:par>
     </p:tnLst>
   </p:timing>
@@ -4024,13 +4021,63 @@
         </p:nvSpPr>
         <p:spPr/>
         <p:txBody>
-          <a:bodyPr/>
+          <a:bodyPr>
+            <a:normAutofit fontScale="92500" lnSpcReduction="20000"/>
+          </a:bodyPr>
           <a:lstStyle/>
           <a:p>
             <a:r>
               <a:rPr lang="en-GB" dirty="0" smtClean="0"/>
-              <a:t>Reading C headers requires something like a pre-processor and a parser.</a:t>
-            </a:r>
+              <a:t>Developer methodology</a:t>
+            </a:r>
+          </a:p>
+          <a:p>
+            <a:pPr lvl="1"/>
+            <a:r>
+              <a:rPr lang="en-GB" dirty="0" smtClean="0"/>
+              <a:t>Waterfall</a:t>
+            </a:r>
+          </a:p>
+          <a:p>
+            <a:pPr lvl="1"/>
+            <a:r>
+              <a:rPr lang="en-GB" dirty="0" smtClean="0"/>
+              <a:t>Scrum</a:t>
+            </a:r>
+          </a:p>
+          <a:p>
+            <a:r>
+              <a:rPr lang="en-GB" dirty="0" smtClean="0"/>
+              <a:t>Programming language</a:t>
+            </a:r>
+          </a:p>
+          <a:p>
+            <a:pPr lvl="1"/>
+            <a:r>
+              <a:rPr lang="en-GB" dirty="0" smtClean="0"/>
+              <a:t>Java</a:t>
+            </a:r>
+          </a:p>
+          <a:p>
+            <a:pPr lvl="1"/>
+            <a:r>
+              <a:rPr lang="en-GB" dirty="0" smtClean="0"/>
+              <a:t>Python</a:t>
+            </a:r>
+          </a:p>
+          <a:p>
+            <a:r>
+              <a:rPr lang="en-GB" dirty="0" smtClean="0"/>
+              <a:t>Pre-processor</a:t>
+            </a:r>
+            <a:endParaRPr lang="en-GB" dirty="0" smtClean="0"/>
+          </a:p>
+          <a:p>
+            <a:r>
+              <a:rPr lang="en-GB" dirty="0" smtClean="0"/>
+              <a:t>Parser</a:t>
+            </a:r>
+            <a:endParaRPr lang="en-GB" dirty="0" smtClean="0"/>
           </a:p>
           <a:p>
             <a:r>
@@ -4038,101 +4085,22 @@
               <a:t>Configuration</a:t>
             </a:r>
             <a:r>
-              <a:rPr lang="nb-NO" dirty="0" smtClean="0"/>
+              <a:rPr lang="nb-NO" dirty="0"/>
               <a:t> </a:t>
             </a:r>
             <a:r>
               <a:rPr lang="nb-NO" dirty="0" err="1" smtClean="0"/>
-              <a:t>also</a:t>
-            </a:r>
-            <a:r>
-              <a:rPr lang="nb-NO" dirty="0" smtClean="0"/>
-              <a:t> </a:t>
-            </a:r>
-            <a:r>
-              <a:rPr lang="nb-NO" dirty="0" err="1" smtClean="0"/>
-              <a:t>needs</a:t>
-            </a:r>
-            <a:r>
-              <a:rPr lang="nb-NO" dirty="0" smtClean="0"/>
-              <a:t> a parser, </a:t>
-            </a:r>
-            <a:r>
-              <a:rPr lang="nb-NO" dirty="0" err="1" smtClean="0"/>
-              <a:t>along</a:t>
-            </a:r>
-            <a:r>
-              <a:rPr lang="nb-NO" dirty="0" smtClean="0"/>
-              <a:t> </a:t>
-            </a:r>
-            <a:r>
-              <a:rPr lang="nb-NO" dirty="0" err="1" smtClean="0"/>
-              <a:t>with</a:t>
-            </a:r>
-            <a:r>
-              <a:rPr lang="nb-NO" dirty="0" smtClean="0"/>
-              <a:t> a format.</a:t>
-            </a:r>
-          </a:p>
-          <a:p>
-            <a:r>
-              <a:rPr lang="nb-NO" dirty="0" smtClean="0"/>
-              <a:t>Programming </a:t>
-            </a:r>
-            <a:r>
-              <a:rPr lang="nb-NO" dirty="0" err="1" smtClean="0"/>
-              <a:t>language</a:t>
-            </a:r>
-            <a:r>
-              <a:rPr lang="nb-NO" dirty="0" smtClean="0"/>
-              <a:t>.</a:t>
-            </a:r>
-          </a:p>
-          <a:p>
-            <a:r>
-              <a:rPr lang="nb-NO" dirty="0" err="1" smtClean="0"/>
-              <a:t>We</a:t>
-            </a:r>
-            <a:r>
-              <a:rPr lang="nb-NO" dirty="0" smtClean="0"/>
-              <a:t> </a:t>
-            </a:r>
-            <a:r>
-              <a:rPr lang="nb-NO" dirty="0" err="1" smtClean="0"/>
-              <a:t>needed</a:t>
-            </a:r>
-            <a:r>
-              <a:rPr lang="nb-NO" dirty="0" smtClean="0"/>
-              <a:t> to </a:t>
-            </a:r>
-            <a:r>
-              <a:rPr lang="nb-NO" dirty="0" err="1" smtClean="0"/>
-              <a:t>choose</a:t>
-            </a:r>
-            <a:r>
-              <a:rPr lang="nb-NO" dirty="0" smtClean="0"/>
-              <a:t> a </a:t>
-            </a:r>
-            <a:r>
-              <a:rPr lang="nb-NO" dirty="0" err="1" smtClean="0"/>
-              <a:t>development</a:t>
-            </a:r>
-            <a:r>
-              <a:rPr lang="nb-NO" dirty="0" smtClean="0"/>
-              <a:t> </a:t>
-            </a:r>
-            <a:r>
-              <a:rPr lang="nb-NO" dirty="0" err="1" smtClean="0"/>
-              <a:t>methodology</a:t>
-            </a:r>
-            <a:r>
-              <a:rPr lang="nb-NO" dirty="0" smtClean="0"/>
-              <a:t>.</a:t>
-            </a:r>
-            <a:endParaRPr lang="en-GB" dirty="0" smtClean="0"/>
-          </a:p>
-          <a:p>
-            <a:endParaRPr lang="en-GB" dirty="0"/>
+              <a:t>method</a:t>
+            </a:r>
+            <a:endParaRPr lang="nb-NO" dirty="0" smtClean="0"/>
+          </a:p>
+          <a:p>
+            <a:pPr lvl="1"/>
+            <a:r>
+              <a:rPr lang="nb-NO" dirty="0" smtClean="0"/>
+              <a:t>YAML</a:t>
+            </a:r>
+            <a:endParaRPr lang="nb-NO" dirty="0" smtClean="0"/>
           </a:p>
         </p:txBody>
       </p:sp>
@@ -4146,13 +4114,13 @@
   <p:clrMapOvr>
     <a:masterClrMapping/>
   </p:clrMapOvr>
-  <p:transition spd="slow">
+  <p:transition xmlns:p14="http://schemas.microsoft.com/office/powerpoint/2010/main" spd="slow">
     <p:push dir="u"/>
   </p:transition>
   <p:timing>
     <p:tnLst>
       <p:par>
-        <p:cTn id="1" dur="indefinite" restart="never" nodeType="tmRoot"/>
+        <p:cTn xmlns:p14="http://schemas.microsoft.com/office/powerpoint/2010/main" id="1" dur="indefinite" restart="never" nodeType="tmRoot"/>
       </p:par>
     </p:tnLst>
   </p:timing>
@@ -4193,398 +4161,6 @@
           <a:p>
             <a:r>
               <a:rPr lang="nb-NO" dirty="0" smtClean="0"/>
-              <a:t>Parser</a:t>
-            </a:r>
-            <a:endParaRPr lang="en-GB" dirty="0"/>
-          </a:p>
-        </p:txBody>
-      </p:sp>
-      <p:sp>
-        <p:nvSpPr>
-          <p:cNvPr id="3" name="Plassholder for innhold 2"/>
-          <p:cNvSpPr>
-            <a:spLocks noGrp="1"/>
-          </p:cNvSpPr>
-          <p:nvPr>
-            <p:ph idx="1"/>
-          </p:nvPr>
-        </p:nvSpPr>
-        <p:spPr/>
-        <p:txBody>
-          <a:bodyPr/>
-          <a:lstStyle/>
-          <a:p>
-            <a:r>
-              <a:rPr lang="nb-NO" dirty="0" smtClean="0"/>
-              <a:t>Hard to make.</a:t>
-            </a:r>
-          </a:p>
-          <a:p>
-            <a:r>
-              <a:rPr lang="nb-NO" dirty="0" err="1" smtClean="0"/>
-              <a:t>Many</a:t>
-            </a:r>
-            <a:r>
-              <a:rPr lang="nb-NO" dirty="0" smtClean="0"/>
-              <a:t> </a:t>
-            </a:r>
-            <a:r>
-              <a:rPr lang="nb-NO" dirty="0" err="1" smtClean="0"/>
-              <a:t>open</a:t>
-            </a:r>
-            <a:r>
-              <a:rPr lang="nb-NO" dirty="0" smtClean="0"/>
-              <a:t> </a:t>
-            </a:r>
-            <a:r>
-              <a:rPr lang="nb-NO" dirty="0" err="1" smtClean="0"/>
-              <a:t>source</a:t>
-            </a:r>
-            <a:r>
-              <a:rPr lang="nb-NO" dirty="0" smtClean="0"/>
-              <a:t> third-party </a:t>
-            </a:r>
-            <a:r>
-              <a:rPr lang="nb-NO" dirty="0" err="1" smtClean="0"/>
-              <a:t>libraries</a:t>
-            </a:r>
-            <a:r>
-              <a:rPr lang="nb-NO" dirty="0" smtClean="0"/>
-              <a:t> </a:t>
-            </a:r>
-            <a:r>
-              <a:rPr lang="nb-NO" dirty="0" err="1" smtClean="0"/>
-              <a:t>available</a:t>
-            </a:r>
-            <a:r>
-              <a:rPr lang="nb-NO" dirty="0" smtClean="0"/>
-              <a:t>.</a:t>
-            </a:r>
-          </a:p>
-          <a:p>
-            <a:r>
-              <a:rPr lang="nb-NO" dirty="0" err="1" smtClean="0"/>
-              <a:t>Pycparser</a:t>
-            </a:r>
-            <a:r>
-              <a:rPr lang="nb-NO" dirty="0" smtClean="0"/>
-              <a:t>, </a:t>
-            </a:r>
-            <a:r>
-              <a:rPr lang="nb-NO" dirty="0" err="1" smtClean="0"/>
-              <a:t>written</a:t>
-            </a:r>
-            <a:r>
-              <a:rPr lang="nb-NO" dirty="0" smtClean="0"/>
-              <a:t> in </a:t>
-            </a:r>
-            <a:r>
-              <a:rPr lang="nb-NO" dirty="0" err="1" smtClean="0"/>
-              <a:t>python</a:t>
-            </a:r>
-            <a:r>
-              <a:rPr lang="nb-NO" dirty="0" smtClean="0"/>
-              <a:t> </a:t>
-            </a:r>
-            <a:r>
-              <a:rPr lang="nb-NO" dirty="0" err="1" smtClean="0"/>
-              <a:t>was</a:t>
-            </a:r>
-            <a:r>
-              <a:rPr lang="nb-NO" dirty="0" smtClean="0"/>
-              <a:t> </a:t>
-            </a:r>
-            <a:r>
-              <a:rPr lang="nb-NO" dirty="0" err="1" smtClean="0"/>
-              <a:t>the</a:t>
-            </a:r>
-            <a:r>
-              <a:rPr lang="nb-NO" dirty="0" smtClean="0"/>
-              <a:t> best parser.</a:t>
-            </a:r>
-          </a:p>
-          <a:p>
-            <a:r>
-              <a:rPr lang="nb-NO" dirty="0" err="1" smtClean="0"/>
-              <a:t>Made</a:t>
-            </a:r>
-            <a:r>
-              <a:rPr lang="nb-NO" dirty="0" smtClean="0"/>
-              <a:t> it </a:t>
-            </a:r>
-            <a:r>
-              <a:rPr lang="nb-NO" dirty="0" err="1" smtClean="0"/>
-              <a:t>convinient</a:t>
-            </a:r>
-            <a:r>
-              <a:rPr lang="nb-NO" dirty="0" smtClean="0"/>
-              <a:t> to </a:t>
-            </a:r>
-            <a:r>
-              <a:rPr lang="nb-NO" dirty="0" err="1" smtClean="0"/>
-              <a:t>choose</a:t>
-            </a:r>
-            <a:r>
-              <a:rPr lang="nb-NO" dirty="0" smtClean="0"/>
-              <a:t> </a:t>
-            </a:r>
-            <a:r>
-              <a:rPr lang="nb-NO" dirty="0" err="1" smtClean="0"/>
-              <a:t>python</a:t>
-            </a:r>
-            <a:r>
-              <a:rPr lang="nb-NO" dirty="0" smtClean="0"/>
-              <a:t> as </a:t>
-            </a:r>
-            <a:r>
-              <a:rPr lang="nb-NO" dirty="0" err="1" smtClean="0"/>
-              <a:t>the</a:t>
-            </a:r>
-            <a:r>
-              <a:rPr lang="nb-NO" dirty="0" smtClean="0"/>
-              <a:t> </a:t>
-            </a:r>
-            <a:r>
-              <a:rPr lang="nb-NO" dirty="0" err="1" smtClean="0"/>
-              <a:t>programming</a:t>
-            </a:r>
-            <a:r>
-              <a:rPr lang="nb-NO" dirty="0" smtClean="0"/>
-              <a:t> </a:t>
-            </a:r>
-            <a:r>
-              <a:rPr lang="nb-NO" dirty="0" err="1" smtClean="0"/>
-              <a:t>language</a:t>
-            </a:r>
-            <a:r>
-              <a:rPr lang="nb-NO" dirty="0"/>
-              <a:t>.</a:t>
-            </a:r>
-            <a:endParaRPr lang="en-GB" dirty="0"/>
-          </a:p>
-        </p:txBody>
-      </p:sp>
-    </p:spTree>
-    <p:extLst>
-      <p:ext uri="{BB962C8B-B14F-4D97-AF65-F5344CB8AC3E}">
-        <p14:creationId xmlns:p14="http://schemas.microsoft.com/office/powerpoint/2010/main" val="829651775"/>
-      </p:ext>
-    </p:extLst>
-  </p:cSld>
-  <p:clrMapOvr>
-    <a:masterClrMapping/>
-  </p:clrMapOvr>
-</p:sld>
-</file>
-
-<file path=ppt/slides/slide13.xml><?xml version="1.0" encoding="utf-8"?>
-<p:sld xmlns:a="http://schemas.openxmlformats.org/drawingml/2006/main" xmlns:r="http://schemas.openxmlformats.org/officeDocument/2006/relationships" xmlns:p="http://schemas.openxmlformats.org/presentationml/2006/main">
-  <p:cSld>
-    <p:spTree>
-      <p:nvGrpSpPr>
-        <p:cNvPr id="1" name=""/>
-        <p:cNvGrpSpPr/>
-        <p:nvPr/>
-      </p:nvGrpSpPr>
-      <p:grpSpPr>
-        <a:xfrm>
-          <a:off x="0" y="0"/>
-          <a:ext cx="0" cy="0"/>
-          <a:chOff x="0" y="0"/>
-          <a:chExt cx="0" cy="0"/>
-        </a:xfrm>
-      </p:grpSpPr>
-      <p:sp>
-        <p:nvSpPr>
-          <p:cNvPr id="2" name="Tittel 1"/>
-          <p:cNvSpPr>
-            <a:spLocks noGrp="1"/>
-          </p:cNvSpPr>
-          <p:nvPr>
-            <p:ph type="title"/>
-          </p:nvPr>
-        </p:nvSpPr>
-        <p:spPr/>
-        <p:txBody>
-          <a:bodyPr/>
-          <a:lstStyle/>
-          <a:p>
-            <a:r>
-              <a:rPr lang="nb-NO" dirty="0" err="1" smtClean="0"/>
-              <a:t>Configuration</a:t>
-            </a:r>
-            <a:endParaRPr lang="en-GB" dirty="0"/>
-          </a:p>
-        </p:txBody>
-      </p:sp>
-      <p:sp>
-        <p:nvSpPr>
-          <p:cNvPr id="3" name="Plassholder for innhold 2"/>
-          <p:cNvSpPr>
-            <a:spLocks noGrp="1"/>
-          </p:cNvSpPr>
-          <p:nvPr>
-            <p:ph idx="1"/>
-          </p:nvPr>
-        </p:nvSpPr>
-        <p:spPr/>
-        <p:txBody>
-          <a:bodyPr/>
-          <a:lstStyle/>
-          <a:p>
-            <a:r>
-              <a:rPr lang="nb-NO" dirty="0" err="1" smtClean="0"/>
-              <a:t>Yaml</a:t>
-            </a:r>
-            <a:endParaRPr lang="nb-NO" dirty="0"/>
-          </a:p>
-          <a:p>
-            <a:endParaRPr lang="en-GB" dirty="0"/>
-          </a:p>
-        </p:txBody>
-      </p:sp>
-    </p:spTree>
-    <p:extLst>
-      <p:ext uri="{BB962C8B-B14F-4D97-AF65-F5344CB8AC3E}">
-        <p14:creationId xmlns:p14="http://schemas.microsoft.com/office/powerpoint/2010/main" val="2786962296"/>
-      </p:ext>
-    </p:extLst>
-  </p:cSld>
-  <p:clrMapOvr>
-    <a:masterClrMapping/>
-  </p:clrMapOvr>
-</p:sld>
-</file>
-
-<file path=ppt/slides/slide14.xml><?xml version="1.0" encoding="utf-8"?>
-<p:sld xmlns:a="http://schemas.openxmlformats.org/drawingml/2006/main" xmlns:r="http://schemas.openxmlformats.org/officeDocument/2006/relationships" xmlns:p="http://schemas.openxmlformats.org/presentationml/2006/main">
-  <p:cSld>
-    <p:spTree>
-      <p:nvGrpSpPr>
-        <p:cNvPr id="1" name=""/>
-        <p:cNvGrpSpPr/>
-        <p:nvPr/>
-      </p:nvGrpSpPr>
-      <p:grpSpPr>
-        <a:xfrm>
-          <a:off x="0" y="0"/>
-          <a:ext cx="0" cy="0"/>
-          <a:chOff x="0" y="0"/>
-          <a:chExt cx="0" cy="0"/>
-        </a:xfrm>
-      </p:grpSpPr>
-      <p:sp>
-        <p:nvSpPr>
-          <p:cNvPr id="2" name="Tittel 1"/>
-          <p:cNvSpPr>
-            <a:spLocks noGrp="1"/>
-          </p:cNvSpPr>
-          <p:nvPr>
-            <p:ph type="title"/>
-          </p:nvPr>
-        </p:nvSpPr>
-        <p:spPr/>
-        <p:txBody>
-          <a:bodyPr/>
-          <a:lstStyle/>
-          <a:p>
-            <a:r>
-              <a:rPr lang="en-GB" dirty="0" smtClean="0"/>
-              <a:t>The process</a:t>
-            </a:r>
-            <a:endParaRPr lang="en-GB" dirty="0"/>
-          </a:p>
-        </p:txBody>
-      </p:sp>
-      <p:sp>
-        <p:nvSpPr>
-          <p:cNvPr id="3" name="Plassholder for innhold 2"/>
-          <p:cNvSpPr>
-            <a:spLocks noGrp="1"/>
-          </p:cNvSpPr>
-          <p:nvPr>
-            <p:ph idx="1"/>
-          </p:nvPr>
-        </p:nvSpPr>
-        <p:spPr/>
-        <p:txBody>
-          <a:bodyPr/>
-          <a:lstStyle/>
-          <a:p>
-            <a:r>
-              <a:rPr lang="nb-NO" dirty="0" err="1" smtClean="0"/>
-              <a:t>Scrum</a:t>
-            </a:r>
-            <a:endParaRPr lang="nb-NO" dirty="0" smtClean="0"/>
-          </a:p>
-          <a:p>
-            <a:r>
-              <a:rPr lang="nb-NO" dirty="0" smtClean="0"/>
-              <a:t>4 sprints</a:t>
-            </a:r>
-          </a:p>
-          <a:p>
-            <a:endParaRPr lang="en-GB" dirty="0"/>
-          </a:p>
-        </p:txBody>
-      </p:sp>
-    </p:spTree>
-    <p:extLst>
-      <p:ext uri="{BB962C8B-B14F-4D97-AF65-F5344CB8AC3E}">
-        <p14:creationId xmlns:p14="http://schemas.microsoft.com/office/powerpoint/2010/main" val="1362037293"/>
-      </p:ext>
-    </p:extLst>
-  </p:cSld>
-  <p:clrMapOvr>
-    <a:masterClrMapping/>
-  </p:clrMapOvr>
-  <p:transition spd="slow">
-    <p:push dir="u"/>
-  </p:transition>
-  <p:timing>
-    <p:tnLst>
-      <p:par>
-        <p:cTn id="1" dur="indefinite" restart="never" nodeType="tmRoot"/>
-      </p:par>
-    </p:tnLst>
-  </p:timing>
-</p:sld>
-</file>
-
-<file path=ppt/slides/slide15.xml><?xml version="1.0" encoding="utf-8"?>
-<p:sld xmlns:a="http://schemas.openxmlformats.org/drawingml/2006/main" xmlns:r="http://schemas.openxmlformats.org/officeDocument/2006/relationships" xmlns:p="http://schemas.openxmlformats.org/presentationml/2006/main">
-  <p:cSld>
-    <p:spTree>
-      <p:nvGrpSpPr>
-        <p:cNvPr id="1" name=""/>
-        <p:cNvGrpSpPr/>
-        <p:nvPr/>
-      </p:nvGrpSpPr>
-      <p:grpSpPr>
-        <a:xfrm>
-          <a:off x="0" y="0"/>
-          <a:ext cx="0" cy="0"/>
-          <a:chOff x="0" y="0"/>
-          <a:chExt cx="0" cy="0"/>
-        </a:xfrm>
-      </p:grpSpPr>
-      <p:sp>
-        <p:nvSpPr>
-          <p:cNvPr id="2" name="Tittel 1"/>
-          <p:cNvSpPr>
-            <a:spLocks noGrp="1"/>
-          </p:cNvSpPr>
-          <p:nvPr>
-            <p:ph type="title"/>
-          </p:nvPr>
-        </p:nvSpPr>
-        <p:spPr/>
-        <p:txBody>
-          <a:bodyPr/>
-          <a:lstStyle/>
-          <a:p>
-            <a:r>
-              <a:rPr lang="nb-NO" dirty="0" smtClean="0"/>
               <a:t>Sprint 1</a:t>
             </a:r>
             <a:endParaRPr lang="en-GB" dirty="0"/>
@@ -4717,7 +4293,7 @@
 </p:sld>
 </file>
 
-<file path=ppt/slides/slide16.xml><?xml version="1.0" encoding="utf-8"?>
+<file path=ppt/slides/slide13.xml><?xml version="1.0" encoding="utf-8"?>
 <p:sld xmlns:a="http://schemas.openxmlformats.org/drawingml/2006/main" xmlns:r="http://schemas.openxmlformats.org/officeDocument/2006/relationships" xmlns:p="http://schemas.openxmlformats.org/presentationml/2006/main">
   <p:cSld>
     <p:spTree>
@@ -4799,7 +4375,7 @@
 </p:sld>
 </file>
 
-<file path=ppt/slides/slide17.xml><?xml version="1.0" encoding="utf-8"?>
+<file path=ppt/slides/slide14.xml><?xml version="1.0" encoding="utf-8"?>
 <p:sld xmlns:a="http://schemas.openxmlformats.org/drawingml/2006/main" xmlns:r="http://schemas.openxmlformats.org/officeDocument/2006/relationships" xmlns:p="http://schemas.openxmlformats.org/presentationml/2006/main">
   <p:cSld>
     <p:spTree>
@@ -4885,7 +4461,7 @@
 </p:sld>
 </file>
 
-<file path=ppt/slides/slide18.xml><?xml version="1.0" encoding="utf-8"?>
+<file path=ppt/slides/slide15.xml><?xml version="1.0" encoding="utf-8"?>
 <p:sld xmlns:a="http://schemas.openxmlformats.org/drawingml/2006/main" xmlns:r="http://schemas.openxmlformats.org/officeDocument/2006/relationships" xmlns:p="http://schemas.openxmlformats.org/presentationml/2006/main">
   <p:cSld>
     <p:spTree>
@@ -5004,7 +4580,7 @@
 </p:sld>
 </file>
 
-<file path=ppt/slides/slide19.xml><?xml version="1.0" encoding="utf-8"?>
+<file path=ppt/slides/slide16.xml><?xml version="1.0" encoding="utf-8"?>
 <p:sld xmlns:a="http://schemas.openxmlformats.org/drawingml/2006/main" xmlns:r="http://schemas.openxmlformats.org/officeDocument/2006/relationships" xmlns:p="http://schemas.openxmlformats.org/presentationml/2006/main">
   <p:cSld>
     <p:spTree>
@@ -5145,7 +4721,7 @@
           </a:prstGeom>
           <a:noFill/>
           <a:extLst>
-            <a:ext uri="{909E8E84-426E-40DD-AFC4-6F175D3DCCD1}">
+            <a:ext uri="{909E8E84-426E-40dd-AFC4-6F175D3DCCD1}">
               <a14:hiddenFill xmlns:a14="http://schemas.microsoft.com/office/drawing/2010/main">
                 <a:solidFill>
                   <a:srgbClr val="FFFFFF"/>
@@ -5159,6 +4735,374 @@
     <p:extLst>
       <p:ext uri="{BB962C8B-B14F-4D97-AF65-F5344CB8AC3E}">
         <p14:creationId xmlns:p14="http://schemas.microsoft.com/office/powerpoint/2010/main" val="2562182055"/>
+      </p:ext>
+    </p:extLst>
+  </p:cSld>
+  <p:clrMapOvr>
+    <a:masterClrMapping/>
+  </p:clrMapOvr>
+</p:sld>
+</file>
+
+<file path=ppt/slides/slide17.xml><?xml version="1.0" encoding="utf-8"?>
+<p:sld xmlns:a="http://schemas.openxmlformats.org/drawingml/2006/main" xmlns:r="http://schemas.openxmlformats.org/officeDocument/2006/relationships" xmlns:p="http://schemas.openxmlformats.org/presentationml/2006/main">
+  <p:cSld>
+    <p:spTree>
+      <p:nvGrpSpPr>
+        <p:cNvPr id="1" name=""/>
+        <p:cNvGrpSpPr/>
+        <p:nvPr/>
+      </p:nvGrpSpPr>
+      <p:grpSpPr>
+        <a:xfrm>
+          <a:off x="0" y="0"/>
+          <a:ext cx="0" cy="0"/>
+          <a:chOff x="0" y="0"/>
+          <a:chExt cx="0" cy="0"/>
+        </a:xfrm>
+      </p:grpSpPr>
+      <p:sp>
+        <p:nvSpPr>
+          <p:cNvPr id="2" name="Tittel 1"/>
+          <p:cNvSpPr>
+            <a:spLocks noGrp="1"/>
+          </p:cNvSpPr>
+          <p:nvPr>
+            <p:ph type="title"/>
+          </p:nvPr>
+        </p:nvSpPr>
+        <p:spPr/>
+        <p:txBody>
+          <a:bodyPr/>
+          <a:lstStyle/>
+          <a:p>
+            <a:r>
+              <a:rPr lang="nb-NO" dirty="0" smtClean="0"/>
+              <a:t>Testing</a:t>
+            </a:r>
+            <a:endParaRPr lang="en-GB" dirty="0"/>
+          </a:p>
+        </p:txBody>
+      </p:sp>
+      <p:sp>
+        <p:nvSpPr>
+          <p:cNvPr id="5" name="Plassholder for innhold 4"/>
+          <p:cNvSpPr>
+            <a:spLocks noGrp="1"/>
+          </p:cNvSpPr>
+          <p:nvPr>
+            <p:ph idx="1"/>
+          </p:nvPr>
+        </p:nvSpPr>
+        <p:spPr/>
+        <p:txBody>
+          <a:bodyPr/>
+          <a:lstStyle/>
+          <a:p>
+            <a:r>
+              <a:rPr lang="nb-NO" dirty="0" smtClean="0"/>
+              <a:t>No </a:t>
+            </a:r>
+            <a:r>
+              <a:rPr lang="nb-NO" dirty="0" err="1" smtClean="0"/>
+              <a:t>access</a:t>
+            </a:r>
+            <a:r>
+              <a:rPr lang="nb-NO" dirty="0" smtClean="0"/>
+              <a:t> to real test input or </a:t>
+            </a:r>
+            <a:r>
+              <a:rPr lang="nb-NO" dirty="0" err="1" smtClean="0"/>
+              <a:t>results</a:t>
+            </a:r>
+            <a:endParaRPr lang="nb-NO" dirty="0" smtClean="0"/>
+          </a:p>
+          <a:p>
+            <a:r>
+              <a:rPr lang="nb-NO" dirty="0" err="1" smtClean="0"/>
+              <a:t>Customer</a:t>
+            </a:r>
+            <a:r>
+              <a:rPr lang="nb-NO" dirty="0" smtClean="0"/>
+              <a:t> has </a:t>
+            </a:r>
+            <a:r>
+              <a:rPr lang="nb-NO" dirty="0" err="1" smtClean="0"/>
+              <a:t>provided</a:t>
+            </a:r>
+            <a:r>
+              <a:rPr lang="nb-NO" dirty="0" smtClean="0"/>
+              <a:t> </a:t>
+            </a:r>
+            <a:r>
+              <a:rPr lang="nb-NO" dirty="0" err="1" smtClean="0"/>
+              <a:t>some</a:t>
+            </a:r>
+            <a:r>
+              <a:rPr lang="nb-NO" dirty="0" smtClean="0"/>
+              <a:t> </a:t>
+            </a:r>
+            <a:r>
+              <a:rPr lang="nb-NO" dirty="0" err="1" smtClean="0"/>
+              <a:t>examples</a:t>
+            </a:r>
+            <a:endParaRPr lang="nb-NO" dirty="0" smtClean="0"/>
+          </a:p>
+          <a:p>
+            <a:r>
+              <a:rPr lang="nb-NO" dirty="0" smtClean="0"/>
+              <a:t>Most rest data must be hand </a:t>
+            </a:r>
+            <a:r>
+              <a:rPr lang="nb-NO" dirty="0" err="1" smtClean="0"/>
+              <a:t>made</a:t>
+            </a:r>
+            <a:endParaRPr lang="en-GB" dirty="0"/>
+          </a:p>
+        </p:txBody>
+      </p:sp>
+    </p:spTree>
+    <p:extLst>
+      <p:ext uri="{BB962C8B-B14F-4D97-AF65-F5344CB8AC3E}">
+        <p14:creationId xmlns:p14="http://schemas.microsoft.com/office/powerpoint/2010/main" val="302753847"/>
+      </p:ext>
+    </p:extLst>
+  </p:cSld>
+  <p:clrMapOvr>
+    <a:masterClrMapping/>
+  </p:clrMapOvr>
+</p:sld>
+</file>
+
+<file path=ppt/slides/slide18.xml><?xml version="1.0" encoding="utf-8"?>
+<p:sld xmlns:a="http://schemas.openxmlformats.org/drawingml/2006/main" xmlns:r="http://schemas.openxmlformats.org/officeDocument/2006/relationships" xmlns:p="http://schemas.openxmlformats.org/presentationml/2006/main">
+  <p:cSld>
+    <p:spTree>
+      <p:nvGrpSpPr>
+        <p:cNvPr id="1" name=""/>
+        <p:cNvGrpSpPr/>
+        <p:nvPr/>
+      </p:nvGrpSpPr>
+      <p:grpSpPr>
+        <a:xfrm>
+          <a:off x="0" y="0"/>
+          <a:ext cx="0" cy="0"/>
+          <a:chOff x="0" y="0"/>
+          <a:chExt cx="0" cy="0"/>
+        </a:xfrm>
+      </p:grpSpPr>
+      <p:sp>
+        <p:nvSpPr>
+          <p:cNvPr id="5" name="Tittel 4"/>
+          <p:cNvSpPr>
+            <a:spLocks noGrp="1"/>
+          </p:cNvSpPr>
+          <p:nvPr>
+            <p:ph type="title"/>
+          </p:nvPr>
+        </p:nvSpPr>
+        <p:spPr/>
+        <p:txBody>
+          <a:bodyPr/>
+          <a:lstStyle/>
+          <a:p>
+            <a:r>
+              <a:rPr lang="nb-NO" dirty="0" smtClean="0"/>
+              <a:t>Sprint 1 </a:t>
+            </a:r>
+            <a:r>
+              <a:rPr lang="nb-NO" dirty="0" err="1" smtClean="0"/>
+              <a:t>retrospect</a:t>
+            </a:r>
+            <a:endParaRPr lang="en-GB" dirty="0"/>
+          </a:p>
+        </p:txBody>
+      </p:sp>
+      <p:sp>
+        <p:nvSpPr>
+          <p:cNvPr id="6" name="Plassholder for innhold 5"/>
+          <p:cNvSpPr>
+            <a:spLocks noGrp="1"/>
+          </p:cNvSpPr>
+          <p:nvPr>
+            <p:ph idx="1"/>
+          </p:nvPr>
+        </p:nvSpPr>
+        <p:spPr/>
+        <p:txBody>
+          <a:bodyPr/>
+          <a:lstStyle/>
+          <a:p>
+            <a:endParaRPr lang="en-GB" dirty="0"/>
+          </a:p>
+        </p:txBody>
+      </p:sp>
+    </p:spTree>
+    <p:extLst>
+      <p:ext uri="{BB962C8B-B14F-4D97-AF65-F5344CB8AC3E}">
+        <p14:creationId xmlns:p14="http://schemas.microsoft.com/office/powerpoint/2010/main" val="3285035911"/>
+      </p:ext>
+    </p:extLst>
+  </p:cSld>
+  <p:clrMapOvr>
+    <a:masterClrMapping/>
+  </p:clrMapOvr>
+</p:sld>
+</file>
+
+<file path=ppt/slides/slide19.xml><?xml version="1.0" encoding="utf-8"?>
+<p:sld xmlns:a="http://schemas.openxmlformats.org/drawingml/2006/main" xmlns:r="http://schemas.openxmlformats.org/officeDocument/2006/relationships" xmlns:p="http://schemas.openxmlformats.org/presentationml/2006/main">
+  <p:cSld>
+    <p:spTree>
+      <p:nvGrpSpPr>
+        <p:cNvPr id="1" name=""/>
+        <p:cNvGrpSpPr/>
+        <p:nvPr/>
+      </p:nvGrpSpPr>
+      <p:grpSpPr>
+        <a:xfrm>
+          <a:off x="0" y="0"/>
+          <a:ext cx="0" cy="0"/>
+          <a:chOff x="0" y="0"/>
+          <a:chExt cx="0" cy="0"/>
+        </a:xfrm>
+      </p:grpSpPr>
+      <p:sp>
+        <p:nvSpPr>
+          <p:cNvPr id="2" name="Tittel 1"/>
+          <p:cNvSpPr>
+            <a:spLocks noGrp="1"/>
+          </p:cNvSpPr>
+          <p:nvPr>
+            <p:ph type="title"/>
+          </p:nvPr>
+        </p:nvSpPr>
+        <p:spPr/>
+        <p:txBody>
+          <a:bodyPr/>
+          <a:lstStyle/>
+          <a:p>
+            <a:r>
+              <a:rPr lang="nb-NO" dirty="0" smtClean="0"/>
+              <a:t>Sprint 2</a:t>
+            </a:r>
+            <a:endParaRPr lang="en-GB" dirty="0"/>
+          </a:p>
+        </p:txBody>
+      </p:sp>
+      <p:sp>
+        <p:nvSpPr>
+          <p:cNvPr id="3" name="Plassholder for innhold 2"/>
+          <p:cNvSpPr>
+            <a:spLocks noGrp="1"/>
+          </p:cNvSpPr>
+          <p:nvPr>
+            <p:ph idx="1"/>
+          </p:nvPr>
+        </p:nvSpPr>
+        <p:spPr/>
+        <p:txBody>
+          <a:bodyPr/>
+          <a:lstStyle/>
+          <a:p>
+            <a:r>
+              <a:rPr lang="nb-NO" dirty="0" smtClean="0"/>
+              <a:t>Support for non-primitive C types</a:t>
+            </a:r>
+          </a:p>
+          <a:p>
+            <a:r>
+              <a:rPr lang="nb-NO" dirty="0" err="1" smtClean="0"/>
+              <a:t>Configuration</a:t>
+            </a:r>
+            <a:r>
+              <a:rPr lang="nb-NO" dirty="0" smtClean="0"/>
+              <a:t> </a:t>
+            </a:r>
+            <a:r>
+              <a:rPr lang="nb-NO" dirty="0" err="1" smtClean="0"/>
+              <a:t>of</a:t>
+            </a:r>
+            <a:r>
+              <a:rPr lang="nb-NO" dirty="0" smtClean="0"/>
+              <a:t> type and </a:t>
+            </a:r>
+            <a:r>
+              <a:rPr lang="nb-NO" dirty="0" err="1" smtClean="0"/>
+              <a:t>member</a:t>
+            </a:r>
+            <a:r>
+              <a:rPr lang="nb-NO" dirty="0" smtClean="0"/>
+              <a:t> </a:t>
+            </a:r>
+            <a:r>
+              <a:rPr lang="nb-NO" dirty="0" err="1" smtClean="0"/>
+              <a:t>semantic</a:t>
+            </a:r>
+            <a:endParaRPr lang="nb-NO" dirty="0" smtClean="0"/>
+          </a:p>
+          <a:p>
+            <a:r>
+              <a:rPr lang="nb-NO" dirty="0" smtClean="0"/>
+              <a:t>Support for 3. party </a:t>
+            </a:r>
+            <a:r>
+              <a:rPr lang="nb-NO" dirty="0" err="1" smtClean="0"/>
+              <a:t>dissectors</a:t>
+            </a:r>
+            <a:r>
+              <a:rPr lang="nb-NO" dirty="0" smtClean="0"/>
+              <a:t> to </a:t>
+            </a:r>
+            <a:r>
+              <a:rPr lang="nb-NO" dirty="0" err="1" smtClean="0"/>
+              <a:t>decode</a:t>
+            </a:r>
+            <a:r>
+              <a:rPr lang="nb-NO" dirty="0" smtClean="0"/>
+              <a:t> trailers </a:t>
+            </a:r>
+            <a:r>
+              <a:rPr lang="nb-NO" dirty="0" err="1" smtClean="0"/>
+              <a:t>of</a:t>
+            </a:r>
+            <a:r>
+              <a:rPr lang="nb-NO" dirty="0" smtClean="0"/>
+              <a:t> a </a:t>
+            </a:r>
+            <a:r>
+              <a:rPr lang="nb-NO" dirty="0" err="1" smtClean="0"/>
+              <a:t>message</a:t>
+            </a:r>
+            <a:endParaRPr lang="nb-NO" dirty="0"/>
+          </a:p>
+          <a:p>
+            <a:r>
+              <a:rPr lang="nb-NO" dirty="0" err="1" smtClean="0"/>
+              <a:t>Refactor</a:t>
+            </a:r>
+            <a:r>
+              <a:rPr lang="nb-NO" dirty="0" smtClean="0"/>
+              <a:t> </a:t>
+            </a:r>
+            <a:r>
+              <a:rPr lang="nb-NO" dirty="0" err="1" smtClean="0"/>
+              <a:t>code</a:t>
+            </a:r>
+            <a:r>
+              <a:rPr lang="nb-NO" dirty="0" smtClean="0"/>
+              <a:t> from sprint 1</a:t>
+            </a:r>
+          </a:p>
+          <a:p>
+            <a:endParaRPr lang="en-GB" dirty="0"/>
+          </a:p>
+        </p:txBody>
+      </p:sp>
+    </p:spTree>
+    <p:extLst>
+      <p:ext uri="{BB962C8B-B14F-4D97-AF65-F5344CB8AC3E}">
+        <p14:creationId xmlns:p14="http://schemas.microsoft.com/office/powerpoint/2010/main" val="2505814243"/>
       </p:ext>
     </p:extLst>
   </p:cSld>
@@ -5201,20 +5145,8 @@
           <a:lstStyle/>
           <a:p>
             <a:r>
-              <a:rPr lang="nb-NO" dirty="0" err="1" smtClean="0"/>
-              <a:t>Outline</a:t>
-            </a:r>
-            <a:r>
-              <a:rPr lang="nb-NO" dirty="0" smtClean="0"/>
-              <a:t> (</a:t>
-            </a:r>
-            <a:r>
-              <a:rPr lang="nb-NO" dirty="0" err="1" smtClean="0"/>
-              <a:t>sketch</a:t>
-            </a:r>
-            <a:r>
-              <a:rPr lang="nb-NO" dirty="0" smtClean="0"/>
-              <a:t>)</a:t>
+              <a:rPr lang="nb-NO" dirty="0" smtClean="0"/>
+              <a:t>Agenda</a:t>
             </a:r>
             <a:endParaRPr lang="en-GB" dirty="0"/>
           </a:p>
@@ -5237,24 +5169,27 @@
           <a:p>
             <a:r>
               <a:rPr lang="nb-NO" dirty="0" smtClean="0"/>
-              <a:t>The team and </a:t>
-            </a:r>
-            <a:r>
-              <a:rPr lang="nb-NO" dirty="0" err="1" smtClean="0"/>
-              <a:t>the</a:t>
-            </a:r>
-            <a:r>
-              <a:rPr lang="nb-NO" dirty="0" smtClean="0"/>
-              <a:t> </a:t>
+              <a:t>The </a:t>
+            </a:r>
+            <a:r>
+              <a:rPr lang="nb-NO" dirty="0" smtClean="0"/>
+              <a:t>team</a:t>
+            </a:r>
+          </a:p>
+          <a:p>
+            <a:r>
+              <a:rPr lang="nb-NO" dirty="0" smtClean="0"/>
+              <a:t>T</a:t>
+            </a:r>
+            <a:r>
+              <a:rPr lang="nb-NO" dirty="0" smtClean="0"/>
+              <a:t>he </a:t>
             </a:r>
             <a:r>
               <a:rPr lang="nb-NO" dirty="0" err="1" smtClean="0"/>
               <a:t>customer</a:t>
             </a:r>
-            <a:r>
-              <a:rPr lang="nb-NO" dirty="0" smtClean="0"/>
-              <a:t>.</a:t>
-            </a:r>
+            <a:endParaRPr lang="nb-NO" dirty="0" smtClean="0"/>
           </a:p>
           <a:p>
             <a:r>
@@ -5265,32 +5200,18 @@
               <a:rPr lang="nb-NO" dirty="0" err="1" smtClean="0"/>
               <a:t>task</a:t>
             </a:r>
-            <a:r>
-              <a:rPr lang="nb-NO" dirty="0" smtClean="0"/>
-              <a:t>.</a:t>
-            </a:r>
-          </a:p>
-          <a:p>
-            <a:r>
-              <a:rPr lang="nb-NO" dirty="0" smtClean="0"/>
-              <a:t>Choices </a:t>
+            <a:endParaRPr lang="nb-NO" dirty="0" smtClean="0"/>
+          </a:p>
+          <a:p>
+            <a:r>
+              <a:rPr lang="nb-NO" dirty="0" smtClean="0"/>
+              <a:t>Pre-</a:t>
             </a:r>
             <a:r>
               <a:rPr lang="nb-NO" dirty="0" err="1" smtClean="0"/>
-              <a:t>we</a:t>
-            </a:r>
-            <a:r>
-              <a:rPr lang="nb-NO" dirty="0" smtClean="0"/>
-              <a:t> </a:t>
-            </a:r>
-            <a:r>
-              <a:rPr lang="nb-NO" dirty="0" err="1" smtClean="0"/>
-              <a:t>made</a:t>
-            </a:r>
-            <a:r>
-              <a:rPr lang="nb-NO" dirty="0" smtClean="0"/>
-              <a:t>.</a:t>
-            </a:r>
+              <a:t>study</a:t>
+            </a:r>
+            <a:endParaRPr lang="nb-NO" dirty="0" smtClean="0"/>
           </a:p>
           <a:p>
             <a:r>
@@ -5313,10 +5234,7 @@
               <a:rPr lang="nb-NO" dirty="0" err="1" smtClean="0"/>
               <a:t>answers</a:t>
             </a:r>
-            <a:r>
-              <a:rPr lang="nb-NO" dirty="0" smtClean="0"/>
-              <a:t>.</a:t>
-            </a:r>
+            <a:endParaRPr lang="nb-NO" dirty="0" smtClean="0"/>
           </a:p>
         </p:txBody>
       </p:sp>
@@ -5334,374 +5252,6 @@
 </file>
 
 <file path=ppt/slides/slide20.xml><?xml version="1.0" encoding="utf-8"?>
-<p:sld xmlns:a="http://schemas.openxmlformats.org/drawingml/2006/main" xmlns:r="http://schemas.openxmlformats.org/officeDocument/2006/relationships" xmlns:p="http://schemas.openxmlformats.org/presentationml/2006/main">
-  <p:cSld>
-    <p:spTree>
-      <p:nvGrpSpPr>
-        <p:cNvPr id="1" name=""/>
-        <p:cNvGrpSpPr/>
-        <p:nvPr/>
-      </p:nvGrpSpPr>
-      <p:grpSpPr>
-        <a:xfrm>
-          <a:off x="0" y="0"/>
-          <a:ext cx="0" cy="0"/>
-          <a:chOff x="0" y="0"/>
-          <a:chExt cx="0" cy="0"/>
-        </a:xfrm>
-      </p:grpSpPr>
-      <p:sp>
-        <p:nvSpPr>
-          <p:cNvPr id="2" name="Tittel 1"/>
-          <p:cNvSpPr>
-            <a:spLocks noGrp="1"/>
-          </p:cNvSpPr>
-          <p:nvPr>
-            <p:ph type="title"/>
-          </p:nvPr>
-        </p:nvSpPr>
-        <p:spPr/>
-        <p:txBody>
-          <a:bodyPr/>
-          <a:lstStyle/>
-          <a:p>
-            <a:r>
-              <a:rPr lang="nb-NO" dirty="0" smtClean="0"/>
-              <a:t>Testing</a:t>
-            </a:r>
-            <a:endParaRPr lang="en-GB" dirty="0"/>
-          </a:p>
-        </p:txBody>
-      </p:sp>
-      <p:sp>
-        <p:nvSpPr>
-          <p:cNvPr id="5" name="Plassholder for innhold 4"/>
-          <p:cNvSpPr>
-            <a:spLocks noGrp="1"/>
-          </p:cNvSpPr>
-          <p:nvPr>
-            <p:ph idx="1"/>
-          </p:nvPr>
-        </p:nvSpPr>
-        <p:spPr/>
-        <p:txBody>
-          <a:bodyPr/>
-          <a:lstStyle/>
-          <a:p>
-            <a:r>
-              <a:rPr lang="nb-NO" dirty="0" smtClean="0"/>
-              <a:t>No </a:t>
-            </a:r>
-            <a:r>
-              <a:rPr lang="nb-NO" dirty="0" err="1" smtClean="0"/>
-              <a:t>access</a:t>
-            </a:r>
-            <a:r>
-              <a:rPr lang="nb-NO" dirty="0" smtClean="0"/>
-              <a:t> to real test input or </a:t>
-            </a:r>
-            <a:r>
-              <a:rPr lang="nb-NO" dirty="0" err="1" smtClean="0"/>
-              <a:t>results</a:t>
-            </a:r>
-            <a:endParaRPr lang="nb-NO" dirty="0" smtClean="0"/>
-          </a:p>
-          <a:p>
-            <a:r>
-              <a:rPr lang="nb-NO" dirty="0" err="1" smtClean="0"/>
-              <a:t>Customer</a:t>
-            </a:r>
-            <a:r>
-              <a:rPr lang="nb-NO" dirty="0" smtClean="0"/>
-              <a:t> has </a:t>
-            </a:r>
-            <a:r>
-              <a:rPr lang="nb-NO" dirty="0" err="1" smtClean="0"/>
-              <a:t>provided</a:t>
-            </a:r>
-            <a:r>
-              <a:rPr lang="nb-NO" dirty="0" smtClean="0"/>
-              <a:t> </a:t>
-            </a:r>
-            <a:r>
-              <a:rPr lang="nb-NO" dirty="0" err="1" smtClean="0"/>
-              <a:t>some</a:t>
-            </a:r>
-            <a:r>
-              <a:rPr lang="nb-NO" dirty="0" smtClean="0"/>
-              <a:t> </a:t>
-            </a:r>
-            <a:r>
-              <a:rPr lang="nb-NO" dirty="0" err="1" smtClean="0"/>
-              <a:t>examples</a:t>
-            </a:r>
-            <a:endParaRPr lang="nb-NO" dirty="0" smtClean="0"/>
-          </a:p>
-          <a:p>
-            <a:r>
-              <a:rPr lang="nb-NO" dirty="0" smtClean="0"/>
-              <a:t>Most rest data must be hand </a:t>
-            </a:r>
-            <a:r>
-              <a:rPr lang="nb-NO" dirty="0" err="1" smtClean="0"/>
-              <a:t>made</a:t>
-            </a:r>
-            <a:endParaRPr lang="en-GB" dirty="0"/>
-          </a:p>
-        </p:txBody>
-      </p:sp>
-    </p:spTree>
-    <p:extLst>
-      <p:ext uri="{BB962C8B-B14F-4D97-AF65-F5344CB8AC3E}">
-        <p14:creationId xmlns:p14="http://schemas.microsoft.com/office/powerpoint/2010/main" val="302753847"/>
-      </p:ext>
-    </p:extLst>
-  </p:cSld>
-  <p:clrMapOvr>
-    <a:masterClrMapping/>
-  </p:clrMapOvr>
-</p:sld>
-</file>
-
-<file path=ppt/slides/slide21.xml><?xml version="1.0" encoding="utf-8"?>
-<p:sld xmlns:a="http://schemas.openxmlformats.org/drawingml/2006/main" xmlns:r="http://schemas.openxmlformats.org/officeDocument/2006/relationships" xmlns:p="http://schemas.openxmlformats.org/presentationml/2006/main">
-  <p:cSld>
-    <p:spTree>
-      <p:nvGrpSpPr>
-        <p:cNvPr id="1" name=""/>
-        <p:cNvGrpSpPr/>
-        <p:nvPr/>
-      </p:nvGrpSpPr>
-      <p:grpSpPr>
-        <a:xfrm>
-          <a:off x="0" y="0"/>
-          <a:ext cx="0" cy="0"/>
-          <a:chOff x="0" y="0"/>
-          <a:chExt cx="0" cy="0"/>
-        </a:xfrm>
-      </p:grpSpPr>
-      <p:sp>
-        <p:nvSpPr>
-          <p:cNvPr id="5" name="Tittel 4"/>
-          <p:cNvSpPr>
-            <a:spLocks noGrp="1"/>
-          </p:cNvSpPr>
-          <p:nvPr>
-            <p:ph type="title"/>
-          </p:nvPr>
-        </p:nvSpPr>
-        <p:spPr/>
-        <p:txBody>
-          <a:bodyPr/>
-          <a:lstStyle/>
-          <a:p>
-            <a:r>
-              <a:rPr lang="nb-NO" dirty="0" smtClean="0"/>
-              <a:t>Sprint 1 </a:t>
-            </a:r>
-            <a:r>
-              <a:rPr lang="nb-NO" dirty="0" err="1" smtClean="0"/>
-              <a:t>retrospect</a:t>
-            </a:r>
-            <a:endParaRPr lang="en-GB" dirty="0"/>
-          </a:p>
-        </p:txBody>
-      </p:sp>
-      <p:sp>
-        <p:nvSpPr>
-          <p:cNvPr id="6" name="Plassholder for innhold 5"/>
-          <p:cNvSpPr>
-            <a:spLocks noGrp="1"/>
-          </p:cNvSpPr>
-          <p:nvPr>
-            <p:ph idx="1"/>
-          </p:nvPr>
-        </p:nvSpPr>
-        <p:spPr/>
-        <p:txBody>
-          <a:bodyPr/>
-          <a:lstStyle/>
-          <a:p>
-            <a:endParaRPr lang="en-GB" dirty="0"/>
-          </a:p>
-        </p:txBody>
-      </p:sp>
-    </p:spTree>
-    <p:extLst>
-      <p:ext uri="{BB962C8B-B14F-4D97-AF65-F5344CB8AC3E}">
-        <p14:creationId xmlns:p14="http://schemas.microsoft.com/office/powerpoint/2010/main" val="3285035911"/>
-      </p:ext>
-    </p:extLst>
-  </p:cSld>
-  <p:clrMapOvr>
-    <a:masterClrMapping/>
-  </p:clrMapOvr>
-</p:sld>
-</file>
-
-<file path=ppt/slides/slide22.xml><?xml version="1.0" encoding="utf-8"?>
-<p:sld xmlns:a="http://schemas.openxmlformats.org/drawingml/2006/main" xmlns:r="http://schemas.openxmlformats.org/officeDocument/2006/relationships" xmlns:p="http://schemas.openxmlformats.org/presentationml/2006/main">
-  <p:cSld>
-    <p:spTree>
-      <p:nvGrpSpPr>
-        <p:cNvPr id="1" name=""/>
-        <p:cNvGrpSpPr/>
-        <p:nvPr/>
-      </p:nvGrpSpPr>
-      <p:grpSpPr>
-        <a:xfrm>
-          <a:off x="0" y="0"/>
-          <a:ext cx="0" cy="0"/>
-          <a:chOff x="0" y="0"/>
-          <a:chExt cx="0" cy="0"/>
-        </a:xfrm>
-      </p:grpSpPr>
-      <p:sp>
-        <p:nvSpPr>
-          <p:cNvPr id="2" name="Tittel 1"/>
-          <p:cNvSpPr>
-            <a:spLocks noGrp="1"/>
-          </p:cNvSpPr>
-          <p:nvPr>
-            <p:ph type="title"/>
-          </p:nvPr>
-        </p:nvSpPr>
-        <p:spPr/>
-        <p:txBody>
-          <a:bodyPr/>
-          <a:lstStyle/>
-          <a:p>
-            <a:r>
-              <a:rPr lang="nb-NO" dirty="0" smtClean="0"/>
-              <a:t>Sprint 2</a:t>
-            </a:r>
-            <a:endParaRPr lang="en-GB" dirty="0"/>
-          </a:p>
-        </p:txBody>
-      </p:sp>
-      <p:sp>
-        <p:nvSpPr>
-          <p:cNvPr id="3" name="Plassholder for innhold 2"/>
-          <p:cNvSpPr>
-            <a:spLocks noGrp="1"/>
-          </p:cNvSpPr>
-          <p:nvPr>
-            <p:ph idx="1"/>
-          </p:nvPr>
-        </p:nvSpPr>
-        <p:spPr/>
-        <p:txBody>
-          <a:bodyPr/>
-          <a:lstStyle/>
-          <a:p>
-            <a:r>
-              <a:rPr lang="nb-NO" dirty="0" smtClean="0"/>
-              <a:t>Support for non-primitive C types</a:t>
-            </a:r>
-          </a:p>
-          <a:p>
-            <a:r>
-              <a:rPr lang="nb-NO" dirty="0" err="1" smtClean="0"/>
-              <a:t>Configuration</a:t>
-            </a:r>
-            <a:r>
-              <a:rPr lang="nb-NO" dirty="0" smtClean="0"/>
-              <a:t> </a:t>
-            </a:r>
-            <a:r>
-              <a:rPr lang="nb-NO" dirty="0" err="1" smtClean="0"/>
-              <a:t>of</a:t>
-            </a:r>
-            <a:r>
-              <a:rPr lang="nb-NO" dirty="0" smtClean="0"/>
-              <a:t> type and </a:t>
-            </a:r>
-            <a:r>
-              <a:rPr lang="nb-NO" dirty="0" err="1" smtClean="0"/>
-              <a:t>member</a:t>
-            </a:r>
-            <a:r>
-              <a:rPr lang="nb-NO" dirty="0" smtClean="0"/>
-              <a:t> </a:t>
-            </a:r>
-            <a:r>
-              <a:rPr lang="nb-NO" dirty="0" err="1" smtClean="0"/>
-              <a:t>semantic</a:t>
-            </a:r>
-            <a:endParaRPr lang="nb-NO" dirty="0" smtClean="0"/>
-          </a:p>
-          <a:p>
-            <a:r>
-              <a:rPr lang="nb-NO" dirty="0" smtClean="0"/>
-              <a:t>Support for 3. party </a:t>
-            </a:r>
-            <a:r>
-              <a:rPr lang="nb-NO" dirty="0" err="1" smtClean="0"/>
-              <a:t>dissectors</a:t>
-            </a:r>
-            <a:r>
-              <a:rPr lang="nb-NO" dirty="0" smtClean="0"/>
-              <a:t> to </a:t>
-            </a:r>
-            <a:r>
-              <a:rPr lang="nb-NO" dirty="0" err="1" smtClean="0"/>
-              <a:t>decode</a:t>
-            </a:r>
-            <a:r>
-              <a:rPr lang="nb-NO" dirty="0" smtClean="0"/>
-              <a:t> trailers </a:t>
-            </a:r>
-            <a:r>
-              <a:rPr lang="nb-NO" dirty="0" err="1" smtClean="0"/>
-              <a:t>of</a:t>
-            </a:r>
-            <a:r>
-              <a:rPr lang="nb-NO" dirty="0" smtClean="0"/>
-              <a:t> a </a:t>
-            </a:r>
-            <a:r>
-              <a:rPr lang="nb-NO" dirty="0" err="1" smtClean="0"/>
-              <a:t>message</a:t>
-            </a:r>
-            <a:endParaRPr lang="nb-NO" dirty="0"/>
-          </a:p>
-          <a:p>
-            <a:r>
-              <a:rPr lang="nb-NO" dirty="0" err="1" smtClean="0"/>
-              <a:t>Refactor</a:t>
-            </a:r>
-            <a:r>
-              <a:rPr lang="nb-NO" dirty="0" smtClean="0"/>
-              <a:t> </a:t>
-            </a:r>
-            <a:r>
-              <a:rPr lang="nb-NO" dirty="0" err="1" smtClean="0"/>
-              <a:t>code</a:t>
-            </a:r>
-            <a:r>
-              <a:rPr lang="nb-NO" dirty="0" smtClean="0"/>
-              <a:t> from sprint 1</a:t>
-            </a:r>
-          </a:p>
-          <a:p>
-            <a:endParaRPr lang="en-GB" dirty="0"/>
-          </a:p>
-        </p:txBody>
-      </p:sp>
-    </p:spTree>
-    <p:extLst>
-      <p:ext uri="{BB962C8B-B14F-4D97-AF65-F5344CB8AC3E}">
-        <p14:creationId xmlns:p14="http://schemas.microsoft.com/office/powerpoint/2010/main" val="2505814243"/>
-      </p:ext>
-    </p:extLst>
-  </p:cSld>
-  <p:clrMapOvr>
-    <a:masterClrMapping/>
-  </p:clrMapOvr>
-</p:sld>
-</file>
-
-<file path=ppt/slides/slide23.xml><?xml version="1.0" encoding="utf-8"?>
 <p:sld xmlns:a="http://schemas.openxmlformats.org/drawingml/2006/main" xmlns:r="http://schemas.openxmlformats.org/officeDocument/2006/relationships" xmlns:p="http://schemas.openxmlformats.org/presentationml/2006/main">
   <p:cSld>
     <p:spTree>
@@ -5783,7 +5333,7 @@
 </p:sld>
 </file>
 
-<file path=ppt/slides/slide24.xml><?xml version="1.0" encoding="utf-8"?>
+<file path=ppt/slides/slide21.xml><?xml version="1.0" encoding="utf-8"?>
 <p:sld xmlns:a="http://schemas.openxmlformats.org/drawingml/2006/main" xmlns:r="http://schemas.openxmlformats.org/officeDocument/2006/relationships" xmlns:p="http://schemas.openxmlformats.org/presentationml/2006/main">
   <p:cSld>
     <p:spTree>
@@ -5883,7 +5433,7 @@
           </a:prstGeom>
           <a:noFill/>
           <a:extLst>
-            <a:ext uri="{909E8E84-426E-40DD-AFC4-6F175D3DCCD1}">
+            <a:ext uri="{909E8E84-426E-40dd-AFC4-6F175D3DCCD1}">
               <a14:hiddenFill xmlns:a14="http://schemas.microsoft.com/office/drawing/2010/main">
                 <a:solidFill>
                   <a:srgbClr val="FFFFFF"/>
@@ -5906,7 +5456,7 @@
 </p:sld>
 </file>
 
-<file path=ppt/slides/slide25.xml><?xml version="1.0" encoding="utf-8"?>
+<file path=ppt/slides/slide22.xml><?xml version="1.0" encoding="utf-8"?>
 <p:sld xmlns:a="http://schemas.openxmlformats.org/drawingml/2006/main" xmlns:r="http://schemas.openxmlformats.org/officeDocument/2006/relationships" xmlns:p="http://schemas.openxmlformats.org/presentationml/2006/main">
   <p:cSld>
     <p:spTree>
@@ -6006,7 +5556,7 @@
           </a:prstGeom>
           <a:noFill/>
           <a:extLst>
-            <a:ext uri="{909E8E84-426E-40DD-AFC4-6F175D3DCCD1}">
+            <a:ext uri="{909E8E84-426E-40dd-AFC4-6F175D3DCCD1}">
               <a14:hiddenFill xmlns:a14="http://schemas.microsoft.com/office/drawing/2010/main">
                 <a:solidFill>
                   <a:srgbClr val="FFFFFF"/>
@@ -6029,7 +5579,7 @@
 </p:sld>
 </file>
 
-<file path=ppt/slides/slide26.xml><?xml version="1.0" encoding="utf-8"?>
+<file path=ppt/slides/slide23.xml><?xml version="1.0" encoding="utf-8"?>
 <p:sld xmlns:a="http://schemas.openxmlformats.org/drawingml/2006/main" xmlns:r="http://schemas.openxmlformats.org/officeDocument/2006/relationships" xmlns:p="http://schemas.openxmlformats.org/presentationml/2006/main">
   <p:cSld>
     <p:spTree>
@@ -6197,7 +5747,7 @@
 </p:sld>
 </file>
 
-<file path=ppt/slides/slide27.xml><?xml version="1.0" encoding="utf-8"?>
+<file path=ppt/slides/slide24.xml><?xml version="1.0" encoding="utf-8"?>
 <p:sld xmlns:a="http://schemas.openxmlformats.org/drawingml/2006/main" xmlns:r="http://schemas.openxmlformats.org/officeDocument/2006/relationships" xmlns:p="http://schemas.openxmlformats.org/presentationml/2006/main">
   <p:cSld>
     <p:spTree>
@@ -6363,7 +5913,7 @@
 </p:sld>
 </file>
 
-<file path=ppt/slides/slide28.xml><?xml version="1.0" encoding="utf-8"?>
+<file path=ppt/slides/slide25.xml><?xml version="1.0" encoding="utf-8"?>
 <p:sld xmlns:a="http://schemas.openxmlformats.org/drawingml/2006/main" xmlns:r="http://schemas.openxmlformats.org/officeDocument/2006/relationships" xmlns:p="http://schemas.openxmlformats.org/presentationml/2006/main">
   <p:cSld>
     <p:spTree>
@@ -6449,6 +5999,406 @@
 </p:sld>
 </file>
 
+<file path=ppt/slides/slide26.xml><?xml version="1.0" encoding="utf-8"?>
+<p:sld xmlns:a="http://schemas.openxmlformats.org/drawingml/2006/main" xmlns:r="http://schemas.openxmlformats.org/officeDocument/2006/relationships" xmlns:p="http://schemas.openxmlformats.org/presentationml/2006/main">
+  <p:cSld>
+    <p:spTree>
+      <p:nvGrpSpPr>
+        <p:cNvPr id="1" name=""/>
+        <p:cNvGrpSpPr/>
+        <p:nvPr/>
+      </p:nvGrpSpPr>
+      <p:grpSpPr>
+        <a:xfrm>
+          <a:off x="0" y="0"/>
+          <a:ext cx="0" cy="0"/>
+          <a:chOff x="0" y="0"/>
+          <a:chExt cx="0" cy="0"/>
+        </a:xfrm>
+      </p:grpSpPr>
+      <p:sp>
+        <p:nvSpPr>
+          <p:cNvPr id="2" name="Tittel 1"/>
+          <p:cNvSpPr>
+            <a:spLocks noGrp="1"/>
+          </p:cNvSpPr>
+          <p:nvPr>
+            <p:ph type="title"/>
+          </p:nvPr>
+        </p:nvSpPr>
+        <p:spPr/>
+        <p:txBody>
+          <a:bodyPr/>
+          <a:lstStyle/>
+          <a:p>
+            <a:r>
+              <a:rPr lang="nb-NO" dirty="0" smtClean="0"/>
+              <a:t>Sprint 3 - Testing</a:t>
+            </a:r>
+            <a:endParaRPr lang="en-GB" dirty="0"/>
+          </a:p>
+        </p:txBody>
+      </p:sp>
+      <p:sp>
+        <p:nvSpPr>
+          <p:cNvPr id="3" name="Plassholder for innhold 2"/>
+          <p:cNvSpPr>
+            <a:spLocks noGrp="1"/>
+          </p:cNvSpPr>
+          <p:nvPr>
+            <p:ph idx="1"/>
+          </p:nvPr>
+        </p:nvSpPr>
+        <p:spPr/>
+        <p:txBody>
+          <a:bodyPr/>
+          <a:lstStyle/>
+          <a:p>
+            <a:r>
+              <a:rPr lang="nb-NO" dirty="0" err="1" smtClean="0"/>
+              <a:t>Availebility</a:t>
+            </a:r>
+            <a:r>
+              <a:rPr lang="nb-NO" dirty="0" smtClean="0"/>
+              <a:t> </a:t>
+            </a:r>
+            <a:r>
+              <a:rPr lang="nb-NO" dirty="0" err="1" smtClean="0"/>
+              <a:t>of</a:t>
+            </a:r>
+            <a:r>
+              <a:rPr lang="nb-NO" dirty="0" smtClean="0"/>
+              <a:t> </a:t>
+            </a:r>
+            <a:r>
+              <a:rPr lang="nb-NO" dirty="0" err="1" smtClean="0"/>
+              <a:t>alignment</a:t>
+            </a:r>
+            <a:r>
+              <a:rPr lang="nb-NO" dirty="0" smtClean="0"/>
+              <a:t> support </a:t>
+            </a:r>
+            <a:r>
+              <a:rPr lang="nb-NO" dirty="0" err="1" smtClean="0"/>
+              <a:t>meant</a:t>
+            </a:r>
+            <a:r>
+              <a:rPr lang="nb-NO" dirty="0" smtClean="0"/>
+              <a:t> </a:t>
+            </a:r>
+            <a:r>
+              <a:rPr lang="nb-NO" dirty="0" err="1" smtClean="0"/>
+              <a:t>that</a:t>
+            </a:r>
+            <a:r>
+              <a:rPr lang="nb-NO" dirty="0" smtClean="0"/>
+              <a:t> </a:t>
+            </a:r>
+            <a:r>
+              <a:rPr lang="nb-NO" dirty="0" err="1" smtClean="0"/>
+              <a:t>we</a:t>
+            </a:r>
+            <a:r>
+              <a:rPr lang="nb-NO" dirty="0" smtClean="0"/>
+              <a:t> </a:t>
+            </a:r>
+            <a:r>
+              <a:rPr lang="nb-NO" dirty="0" err="1" smtClean="0"/>
+              <a:t>could</a:t>
+            </a:r>
+            <a:r>
+              <a:rPr lang="nb-NO" dirty="0" smtClean="0"/>
+              <a:t> have a C program </a:t>
+            </a:r>
+            <a:r>
+              <a:rPr lang="nb-NO" dirty="0" err="1" smtClean="0"/>
+              <a:t>generate</a:t>
+            </a:r>
+            <a:r>
+              <a:rPr lang="nb-NO" dirty="0" smtClean="0"/>
+              <a:t> test data.</a:t>
+            </a:r>
+          </a:p>
+          <a:p>
+            <a:r>
+              <a:rPr lang="nb-NO" dirty="0" err="1" smtClean="0"/>
+              <a:t>Needed</a:t>
+            </a:r>
+            <a:r>
+              <a:rPr lang="nb-NO" dirty="0" smtClean="0"/>
+              <a:t> to </a:t>
+            </a:r>
+            <a:r>
+              <a:rPr lang="nb-NO" dirty="0" err="1" smtClean="0"/>
+              <a:t>change</a:t>
+            </a:r>
+            <a:r>
+              <a:rPr lang="nb-NO" dirty="0" smtClean="0"/>
+              <a:t> all </a:t>
+            </a:r>
+            <a:r>
+              <a:rPr lang="nb-NO" dirty="0" err="1" smtClean="0"/>
+              <a:t>previous</a:t>
+            </a:r>
+            <a:r>
+              <a:rPr lang="nb-NO" dirty="0" smtClean="0"/>
+              <a:t> test data.</a:t>
+            </a:r>
+          </a:p>
+          <a:p>
+            <a:endParaRPr lang="en-GB" dirty="0"/>
+          </a:p>
+        </p:txBody>
+      </p:sp>
+    </p:spTree>
+    <p:extLst>
+      <p:ext uri="{BB962C8B-B14F-4D97-AF65-F5344CB8AC3E}">
+        <p14:creationId xmlns:p14="http://schemas.microsoft.com/office/powerpoint/2010/main" val="3996143895"/>
+      </p:ext>
+    </p:extLst>
+  </p:cSld>
+  <p:clrMapOvr>
+    <a:masterClrMapping/>
+  </p:clrMapOvr>
+</p:sld>
+</file>
+
+<file path=ppt/slides/slide27.xml><?xml version="1.0" encoding="utf-8"?>
+<p:sld xmlns:a="http://schemas.openxmlformats.org/drawingml/2006/main" xmlns:r="http://schemas.openxmlformats.org/officeDocument/2006/relationships" xmlns:p="http://schemas.openxmlformats.org/presentationml/2006/main">
+  <p:cSld>
+    <p:spTree>
+      <p:nvGrpSpPr>
+        <p:cNvPr id="1" name=""/>
+        <p:cNvGrpSpPr/>
+        <p:nvPr/>
+      </p:nvGrpSpPr>
+      <p:grpSpPr>
+        <a:xfrm>
+          <a:off x="0" y="0"/>
+          <a:ext cx="0" cy="0"/>
+          <a:chOff x="0" y="0"/>
+          <a:chExt cx="0" cy="0"/>
+        </a:xfrm>
+      </p:grpSpPr>
+      <p:sp>
+        <p:nvSpPr>
+          <p:cNvPr id="2" name="Tittel 1"/>
+          <p:cNvSpPr>
+            <a:spLocks noGrp="1"/>
+          </p:cNvSpPr>
+          <p:nvPr>
+            <p:ph type="title"/>
+          </p:nvPr>
+        </p:nvSpPr>
+        <p:spPr/>
+        <p:txBody>
+          <a:bodyPr/>
+          <a:lstStyle/>
+          <a:p>
+            <a:r>
+              <a:rPr lang="nb-NO" dirty="0" smtClean="0"/>
+              <a:t>Sprint 3 </a:t>
+            </a:r>
+            <a:r>
+              <a:rPr lang="nb-NO" dirty="0" err="1" smtClean="0"/>
+              <a:t>retrospect</a:t>
+            </a:r>
+            <a:endParaRPr lang="en-GB" dirty="0"/>
+          </a:p>
+        </p:txBody>
+      </p:sp>
+      <p:sp>
+        <p:nvSpPr>
+          <p:cNvPr id="3" name="Plassholder for innhold 2"/>
+          <p:cNvSpPr>
+            <a:spLocks noGrp="1"/>
+          </p:cNvSpPr>
+          <p:nvPr>
+            <p:ph idx="1"/>
+          </p:nvPr>
+        </p:nvSpPr>
+        <p:spPr/>
+        <p:txBody>
+          <a:bodyPr/>
+          <a:lstStyle/>
+          <a:p>
+            <a:r>
+              <a:rPr lang="nb-NO" dirty="0" smtClean="0"/>
+              <a:t>A </a:t>
+            </a:r>
+            <a:r>
+              <a:rPr lang="nb-NO" dirty="0" err="1" smtClean="0"/>
+              <a:t>better</a:t>
+            </a:r>
+            <a:r>
+              <a:rPr lang="nb-NO" dirty="0" smtClean="0"/>
+              <a:t> </a:t>
+            </a:r>
+            <a:r>
+              <a:rPr lang="nb-NO" dirty="0" err="1" smtClean="0"/>
+              <a:t>process</a:t>
+            </a:r>
+            <a:endParaRPr lang="nb-NO" dirty="0" smtClean="0"/>
+          </a:p>
+          <a:p>
+            <a:r>
+              <a:rPr lang="nb-NO" dirty="0" smtClean="0"/>
+              <a:t>More </a:t>
+            </a:r>
+            <a:r>
+              <a:rPr lang="nb-NO" dirty="0" err="1" smtClean="0"/>
+              <a:t>effort</a:t>
+            </a:r>
+            <a:endParaRPr lang="nb-NO" dirty="0" smtClean="0"/>
+          </a:p>
+          <a:p>
+            <a:r>
+              <a:rPr lang="nb-NO" dirty="0" smtClean="0"/>
+              <a:t>Too </a:t>
+            </a:r>
+            <a:r>
+              <a:rPr lang="nb-NO" dirty="0" err="1" smtClean="0"/>
+              <a:t>many</a:t>
+            </a:r>
+            <a:r>
+              <a:rPr lang="nb-NO" dirty="0" smtClean="0"/>
+              <a:t> taskes </a:t>
+            </a:r>
+            <a:r>
+              <a:rPr lang="nb-NO" dirty="0" err="1" smtClean="0"/>
+              <a:t>planned</a:t>
+            </a:r>
+            <a:endParaRPr lang="nb-NO" dirty="0" smtClean="0"/>
+          </a:p>
+          <a:p>
+            <a:r>
+              <a:rPr lang="nb-NO" dirty="0" smtClean="0"/>
+              <a:t>Time used for </a:t>
+            </a:r>
+            <a:r>
+              <a:rPr lang="nb-NO" dirty="0" err="1" smtClean="0"/>
+              <a:t>project</a:t>
+            </a:r>
+            <a:r>
+              <a:rPr lang="nb-NO" dirty="0" smtClean="0"/>
+              <a:t> management </a:t>
+            </a:r>
+            <a:r>
+              <a:rPr lang="nb-NO" dirty="0" err="1" smtClean="0"/>
+              <a:t>underestimated</a:t>
+            </a:r>
+            <a:endParaRPr lang="en-GB" dirty="0"/>
+          </a:p>
+        </p:txBody>
+      </p:sp>
+    </p:spTree>
+    <p:extLst>
+      <p:ext uri="{BB962C8B-B14F-4D97-AF65-F5344CB8AC3E}">
+        <p14:creationId xmlns:p14="http://schemas.microsoft.com/office/powerpoint/2010/main" val="2811907645"/>
+      </p:ext>
+    </p:extLst>
+  </p:cSld>
+  <p:clrMapOvr>
+    <a:masterClrMapping/>
+  </p:clrMapOvr>
+</p:sld>
+</file>
+
+<file path=ppt/slides/slide28.xml><?xml version="1.0" encoding="utf-8"?>
+<p:sld xmlns:a="http://schemas.openxmlformats.org/drawingml/2006/main" xmlns:r="http://schemas.openxmlformats.org/officeDocument/2006/relationships" xmlns:p="http://schemas.openxmlformats.org/presentationml/2006/main">
+  <p:cSld>
+    <p:spTree>
+      <p:nvGrpSpPr>
+        <p:cNvPr id="1" name=""/>
+        <p:cNvGrpSpPr/>
+        <p:nvPr/>
+      </p:nvGrpSpPr>
+      <p:grpSpPr>
+        <a:xfrm>
+          <a:off x="0" y="0"/>
+          <a:ext cx="0" cy="0"/>
+          <a:chOff x="0" y="0"/>
+          <a:chExt cx="0" cy="0"/>
+        </a:xfrm>
+      </p:grpSpPr>
+      <p:sp>
+        <p:nvSpPr>
+          <p:cNvPr id="2" name="Tittel 1"/>
+          <p:cNvSpPr>
+            <a:spLocks noGrp="1"/>
+          </p:cNvSpPr>
+          <p:nvPr>
+            <p:ph type="title"/>
+          </p:nvPr>
+        </p:nvSpPr>
+        <p:spPr/>
+        <p:txBody>
+          <a:bodyPr/>
+          <a:lstStyle/>
+          <a:p>
+            <a:r>
+              <a:rPr lang="nb-NO" dirty="0" smtClean="0"/>
+              <a:t>Sprint 4</a:t>
+            </a:r>
+            <a:endParaRPr lang="en-GB" dirty="0"/>
+          </a:p>
+        </p:txBody>
+      </p:sp>
+      <p:sp>
+        <p:nvSpPr>
+          <p:cNvPr id="3" name="Plassholder for innhold 2"/>
+          <p:cNvSpPr>
+            <a:spLocks noGrp="1"/>
+          </p:cNvSpPr>
+          <p:nvPr>
+            <p:ph idx="1"/>
+          </p:nvPr>
+        </p:nvSpPr>
+        <p:spPr/>
+        <p:txBody>
+          <a:bodyPr/>
+          <a:lstStyle/>
+          <a:p>
+            <a:r>
+              <a:rPr lang="nb-NO" dirty="0" err="1" smtClean="0"/>
+              <a:t>Find</a:t>
+            </a:r>
+            <a:r>
+              <a:rPr lang="nb-NO" dirty="0" smtClean="0"/>
+              <a:t> </a:t>
+            </a:r>
+            <a:r>
+              <a:rPr lang="nb-NO" dirty="0" err="1" smtClean="0"/>
+              <a:t>missing</a:t>
+            </a:r>
+            <a:r>
+              <a:rPr lang="nb-NO" dirty="0" smtClean="0"/>
+              <a:t> </a:t>
+            </a:r>
+            <a:r>
+              <a:rPr lang="nb-NO" dirty="0" err="1" smtClean="0"/>
+              <a:t>includes</a:t>
+            </a:r>
+            <a:endParaRPr lang="nb-NO" smtClean="0"/>
+          </a:p>
+          <a:p>
+            <a:endParaRPr lang="en-GB"/>
+          </a:p>
+        </p:txBody>
+      </p:sp>
+    </p:spTree>
+    <p:extLst>
+      <p:ext uri="{BB962C8B-B14F-4D97-AF65-F5344CB8AC3E}">
+        <p14:creationId xmlns:p14="http://schemas.microsoft.com/office/powerpoint/2010/main" val="3432911911"/>
+      </p:ext>
+    </p:extLst>
+  </p:cSld>
+  <p:clrMapOvr>
+    <a:masterClrMapping/>
+  </p:clrMapOvr>
+</p:sld>
+</file>
+
 <file path=ppt/slides/slide29.xml><?xml version="1.0" encoding="utf-8"?>
 <p:sld xmlns:a="http://schemas.openxmlformats.org/drawingml/2006/main" xmlns:r="http://schemas.openxmlformats.org/officeDocument/2006/relationships" xmlns:p="http://schemas.openxmlformats.org/presentationml/2006/main">
   <p:cSld>
@@ -6482,128 +6432,50 @@
           <a:lstStyle/>
           <a:p>
             <a:r>
-              <a:rPr lang="nb-NO" dirty="0" smtClean="0"/>
-              <a:t>Sprint 3 - Testing</a:t>
+              <a:rPr lang="nb-NO" dirty="0" err="1" smtClean="0"/>
+              <a:t>Module</a:t>
+            </a:r>
+            <a:r>
+              <a:rPr lang="nb-NO" dirty="0" smtClean="0"/>
+              <a:t> design</a:t>
             </a:r>
             <a:endParaRPr lang="en-GB" dirty="0"/>
           </a:p>
         </p:txBody>
       </p:sp>
-      <p:sp>
-        <p:nvSpPr>
-          <p:cNvPr id="3" name="Plassholder for innhold 2"/>
-          <p:cNvSpPr>
-            <a:spLocks noGrp="1"/>
-          </p:cNvSpPr>
+      <p:pic>
+        <p:nvPicPr>
+          <p:cNvPr id="4" name="Plassholder for innhold 3"/>
+          <p:cNvPicPr>
+            <a:picLocks noGrp="1" noChangeAspect="1"/>
+          </p:cNvPicPr>
           <p:nvPr>
             <p:ph idx="1"/>
           </p:nvPr>
-        </p:nvSpPr>
-        <p:spPr/>
-        <p:txBody>
-          <a:bodyPr/>
-          <a:lstStyle/>
-          <a:p>
-            <a:r>
-              <a:rPr lang="nb-NO" dirty="0" err="1" smtClean="0"/>
-              <a:t>Availebility</a:t>
-            </a:r>
-            <a:r>
-              <a:rPr lang="nb-NO" dirty="0" smtClean="0"/>
-              <a:t> </a:t>
-            </a:r>
-            <a:r>
-              <a:rPr lang="nb-NO" dirty="0" err="1" smtClean="0"/>
-              <a:t>of</a:t>
-            </a:r>
-            <a:r>
-              <a:rPr lang="nb-NO" dirty="0" smtClean="0"/>
-              <a:t> </a:t>
-            </a:r>
-            <a:r>
-              <a:rPr lang="nb-NO" dirty="0" err="1" smtClean="0"/>
-              <a:t>alignment</a:t>
-            </a:r>
-            <a:r>
-              <a:rPr lang="nb-NO" dirty="0" smtClean="0"/>
-              <a:t> support </a:t>
-            </a:r>
-            <a:r>
-              <a:rPr lang="nb-NO" dirty="0" err="1" smtClean="0"/>
-              <a:t>meant</a:t>
-            </a:r>
-            <a:r>
-              <a:rPr lang="nb-NO" dirty="0" smtClean="0"/>
-              <a:t> </a:t>
-            </a:r>
-            <a:r>
-              <a:rPr lang="nb-NO" dirty="0" err="1" smtClean="0"/>
-              <a:t>that</a:t>
-            </a:r>
-            <a:r>
-              <a:rPr lang="nb-NO" dirty="0" smtClean="0"/>
-              <a:t> </a:t>
-            </a:r>
-            <a:r>
-              <a:rPr lang="nb-NO" dirty="0" err="1" smtClean="0"/>
-              <a:t>we</a:t>
-            </a:r>
-            <a:r>
-              <a:rPr lang="nb-NO" dirty="0" smtClean="0"/>
-              <a:t> </a:t>
-            </a:r>
-            <a:r>
-              <a:rPr lang="nb-NO" dirty="0" err="1" smtClean="0"/>
-              <a:t>could</a:t>
-            </a:r>
-            <a:r>
-              <a:rPr lang="nb-NO" dirty="0" smtClean="0"/>
-              <a:t> have a C program </a:t>
-            </a:r>
-            <a:r>
-              <a:rPr lang="nb-NO" dirty="0" err="1" smtClean="0"/>
-              <a:t>generate</a:t>
-            </a:r>
-            <a:r>
-              <a:rPr lang="nb-NO" dirty="0" smtClean="0"/>
-              <a:t> test data.</a:t>
-            </a:r>
-          </a:p>
-          <a:p>
-            <a:r>
-              <a:rPr lang="nb-NO" dirty="0" err="1" smtClean="0"/>
-              <a:t>Needed</a:t>
-            </a:r>
-            <a:r>
-              <a:rPr lang="nb-NO" dirty="0" smtClean="0"/>
-              <a:t> to </a:t>
-            </a:r>
-            <a:r>
-              <a:rPr lang="nb-NO" dirty="0" err="1" smtClean="0"/>
-              <a:t>change</a:t>
-            </a:r>
-            <a:r>
-              <a:rPr lang="nb-NO" dirty="0" smtClean="0"/>
-              <a:t> all </a:t>
-            </a:r>
-            <a:r>
-              <a:rPr lang="nb-NO" dirty="0" err="1" smtClean="0"/>
-              <a:t>previous</a:t>
-            </a:r>
-            <a:r>
-              <a:rPr lang="nb-NO" dirty="0" smtClean="0"/>
-              <a:t> test data.</a:t>
-            </a:r>
-          </a:p>
-          <a:p>
-            <a:endParaRPr lang="en-GB" dirty="0"/>
-          </a:p>
-        </p:txBody>
-      </p:sp>
+        </p:nvPicPr>
+        <p:blipFill>
+          <a:blip r:embed="rId2">
+            <a:extLst>
+              <a:ext uri="{28A0092B-C50C-407E-A947-70E740481C1C}">
+                <a14:useLocalDpi xmlns:a14="http://schemas.microsoft.com/office/drawing/2010/main" val="0"/>
+              </a:ext>
+            </a:extLst>
+          </a:blip>
+          <a:stretch>
+            <a:fillRect/>
+          </a:stretch>
+        </p:blipFill>
+        <p:spPr>
+          <a:xfrm>
+            <a:off x="1753111" y="1772135"/>
+            <a:ext cx="5631832" cy="4146514"/>
+          </a:xfrm>
+        </p:spPr>
+      </p:pic>
     </p:spTree>
     <p:extLst>
       <p:ext uri="{BB962C8B-B14F-4D97-AF65-F5344CB8AC3E}">
-        <p14:creationId xmlns:p14="http://schemas.microsoft.com/office/powerpoint/2010/main" val="3996143895"/>
+        <p14:creationId xmlns:p14="http://schemas.microsoft.com/office/powerpoint/2010/main" val="3633823063"/>
       </p:ext>
     </p:extLst>
   </p:cSld>
@@ -6728,12 +6600,8 @@
           <a:lstStyle/>
           <a:p>
             <a:r>
-              <a:rPr lang="nb-NO" dirty="0" smtClean="0"/>
-              <a:t>Sprint 3 </a:t>
-            </a:r>
-            <a:r>
-              <a:rPr lang="nb-NO" dirty="0" err="1" smtClean="0"/>
-              <a:t>retrospect</a:t>
+              <a:rPr lang="en-GB" dirty="0" smtClean="0"/>
+              <a:t>Limitations</a:t>
             </a:r>
             <a:endParaRPr lang="en-GB" dirty="0"/>
           </a:p>
@@ -6755,84 +6623,41 @@
           <a:lstStyle/>
           <a:p>
             <a:r>
-              <a:rPr lang="nb-NO" dirty="0" smtClean="0"/>
-              <a:t>A </a:t>
-            </a:r>
-            <a:r>
-              <a:rPr lang="nb-NO" dirty="0" err="1" smtClean="0"/>
-              <a:t>better</a:t>
-            </a:r>
-            <a:r>
-              <a:rPr lang="nb-NO" dirty="0" smtClean="0"/>
-              <a:t> </a:t>
-            </a:r>
-            <a:r>
-              <a:rPr lang="nb-NO" dirty="0" err="1" smtClean="0"/>
-              <a:t>process</a:t>
-            </a:r>
-            <a:endParaRPr lang="nb-NO" dirty="0" smtClean="0"/>
-          </a:p>
-          <a:p>
-            <a:r>
-              <a:rPr lang="nb-NO" dirty="0" smtClean="0"/>
-              <a:t>More </a:t>
-            </a:r>
-            <a:r>
-              <a:rPr lang="nb-NO" dirty="0" err="1" smtClean="0"/>
-              <a:t>effort</a:t>
-            </a:r>
-            <a:endParaRPr lang="nb-NO" dirty="0" smtClean="0"/>
-          </a:p>
-          <a:p>
-            <a:r>
-              <a:rPr lang="nb-NO" dirty="0" smtClean="0"/>
-              <a:t>Too </a:t>
-            </a:r>
-            <a:r>
-              <a:rPr lang="nb-NO" dirty="0" err="1" smtClean="0"/>
-              <a:t>many</a:t>
-            </a:r>
-            <a:r>
-              <a:rPr lang="nb-NO" dirty="0" smtClean="0"/>
-              <a:t> taskes </a:t>
-            </a:r>
-            <a:r>
-              <a:rPr lang="nb-NO" dirty="0" err="1" smtClean="0"/>
-              <a:t>planned</a:t>
-            </a:r>
-            <a:endParaRPr lang="nb-NO" dirty="0" smtClean="0"/>
-          </a:p>
-          <a:p>
-            <a:r>
-              <a:rPr lang="nb-NO" dirty="0" smtClean="0"/>
-              <a:t>Time used for </a:t>
-            </a:r>
-            <a:r>
-              <a:rPr lang="nb-NO" dirty="0" err="1" smtClean="0"/>
-              <a:t>project</a:t>
-            </a:r>
-            <a:r>
-              <a:rPr lang="nb-NO" dirty="0" smtClean="0"/>
-              <a:t> management </a:t>
-            </a:r>
-            <a:r>
-              <a:rPr lang="nb-NO" dirty="0" err="1" smtClean="0"/>
-              <a:t>underestimated</a:t>
-            </a:r>
-            <a:endParaRPr lang="en-GB" dirty="0"/>
+              <a:rPr lang="en-GB" dirty="0" smtClean="0"/>
+              <a:t>Thales has the military as a customer, so the code is confedential.</a:t>
+            </a:r>
+          </a:p>
+          <a:p>
+            <a:r>
+              <a:rPr lang="en-GB" dirty="0" smtClean="0"/>
+              <a:t>Wireshark’s lua integration is under development, and buggy.</a:t>
+            </a:r>
+          </a:p>
+          <a:p>
+            <a:endParaRPr lang="en-GB" dirty="0" smtClean="0"/>
           </a:p>
         </p:txBody>
       </p:sp>
     </p:spTree>
     <p:extLst>
       <p:ext uri="{BB962C8B-B14F-4D97-AF65-F5344CB8AC3E}">
-        <p14:creationId xmlns:p14="http://schemas.microsoft.com/office/powerpoint/2010/main" val="2811907645"/>
+        <p14:creationId xmlns:p14="http://schemas.microsoft.com/office/powerpoint/2010/main" val="779040666"/>
       </p:ext>
     </p:extLst>
   </p:cSld>
   <p:clrMapOvr>
     <a:masterClrMapping/>
   </p:clrMapOvr>
+  <p:transition xmlns:p14="http://schemas.microsoft.com/office/powerpoint/2010/main" spd="slow">
+    <p:push dir="u"/>
+  </p:transition>
+  <p:timing>
+    <p:tnLst>
+      <p:par>
+        <p:cTn xmlns:p14="http://schemas.microsoft.com/office/powerpoint/2010/main" id="1" dur="indefinite" restart="never" nodeType="tmRoot"/>
+      </p:par>
+    </p:tnLst>
+  </p:timing>
 </p:sld>
 </file>
 
@@ -6869,281 +6694,6 @@
           <a:lstStyle/>
           <a:p>
             <a:r>
-              <a:rPr lang="nb-NO" dirty="0" smtClean="0"/>
-              <a:t>Sprint 4</a:t>
-            </a:r>
-            <a:endParaRPr lang="en-GB" dirty="0"/>
-          </a:p>
-        </p:txBody>
-      </p:sp>
-      <p:sp>
-        <p:nvSpPr>
-          <p:cNvPr id="3" name="Plassholder for innhold 2"/>
-          <p:cNvSpPr>
-            <a:spLocks noGrp="1"/>
-          </p:cNvSpPr>
-          <p:nvPr>
-            <p:ph idx="1"/>
-          </p:nvPr>
-        </p:nvSpPr>
-        <p:spPr/>
-        <p:txBody>
-          <a:bodyPr/>
-          <a:lstStyle/>
-          <a:p>
-            <a:r>
-              <a:rPr lang="nb-NO" dirty="0" err="1" smtClean="0"/>
-              <a:t>Find</a:t>
-            </a:r>
-            <a:r>
-              <a:rPr lang="nb-NO" dirty="0" smtClean="0"/>
-              <a:t> </a:t>
-            </a:r>
-            <a:r>
-              <a:rPr lang="nb-NO" dirty="0" err="1" smtClean="0"/>
-              <a:t>missing</a:t>
-            </a:r>
-            <a:r>
-              <a:rPr lang="nb-NO" dirty="0" smtClean="0"/>
-              <a:t> </a:t>
-            </a:r>
-            <a:r>
-              <a:rPr lang="nb-NO" dirty="0" err="1" smtClean="0"/>
-              <a:t>includes</a:t>
-            </a:r>
-            <a:endParaRPr lang="nb-NO" smtClean="0"/>
-          </a:p>
-          <a:p>
-            <a:endParaRPr lang="en-GB"/>
-          </a:p>
-        </p:txBody>
-      </p:sp>
-    </p:spTree>
-    <p:extLst>
-      <p:ext uri="{BB962C8B-B14F-4D97-AF65-F5344CB8AC3E}">
-        <p14:creationId xmlns:p14="http://schemas.microsoft.com/office/powerpoint/2010/main" val="3432911911"/>
-      </p:ext>
-    </p:extLst>
-  </p:cSld>
-  <p:clrMapOvr>
-    <a:masterClrMapping/>
-  </p:clrMapOvr>
-</p:sld>
-</file>
-
-<file path=ppt/slides/slide32.xml><?xml version="1.0" encoding="utf-8"?>
-<p:sld xmlns:a="http://schemas.openxmlformats.org/drawingml/2006/main" xmlns:r="http://schemas.openxmlformats.org/officeDocument/2006/relationships" xmlns:p="http://schemas.openxmlformats.org/presentationml/2006/main">
-  <p:cSld>
-    <p:spTree>
-      <p:nvGrpSpPr>
-        <p:cNvPr id="1" name=""/>
-        <p:cNvGrpSpPr/>
-        <p:nvPr/>
-      </p:nvGrpSpPr>
-      <p:grpSpPr>
-        <a:xfrm>
-          <a:off x="0" y="0"/>
-          <a:ext cx="0" cy="0"/>
-          <a:chOff x="0" y="0"/>
-          <a:chExt cx="0" cy="0"/>
-        </a:xfrm>
-      </p:grpSpPr>
-      <p:sp>
-        <p:nvSpPr>
-          <p:cNvPr id="2" name="Tittel 1"/>
-          <p:cNvSpPr>
-            <a:spLocks noGrp="1"/>
-          </p:cNvSpPr>
-          <p:nvPr>
-            <p:ph type="title"/>
-          </p:nvPr>
-        </p:nvSpPr>
-        <p:spPr/>
-        <p:txBody>
-          <a:bodyPr/>
-          <a:lstStyle/>
-          <a:p>
-            <a:r>
-              <a:rPr lang="nb-NO" dirty="0" err="1" smtClean="0"/>
-              <a:t>Module</a:t>
-            </a:r>
-            <a:r>
-              <a:rPr lang="nb-NO" dirty="0" smtClean="0"/>
-              <a:t> design</a:t>
-            </a:r>
-            <a:endParaRPr lang="en-GB" dirty="0"/>
-          </a:p>
-        </p:txBody>
-      </p:sp>
-      <p:pic>
-        <p:nvPicPr>
-          <p:cNvPr id="4" name="Plassholder for innhold 3"/>
-          <p:cNvPicPr>
-            <a:picLocks noGrp="1" noChangeAspect="1"/>
-          </p:cNvPicPr>
-          <p:nvPr>
-            <p:ph idx="1"/>
-          </p:nvPr>
-        </p:nvPicPr>
-        <p:blipFill>
-          <a:blip r:embed="rId2">
-            <a:extLst>
-              <a:ext uri="{28A0092B-C50C-407E-A947-70E740481C1C}">
-                <a14:useLocalDpi xmlns:a14="http://schemas.microsoft.com/office/drawing/2010/main" val="0"/>
-              </a:ext>
-            </a:extLst>
-          </a:blip>
-          <a:stretch>
-            <a:fillRect/>
-          </a:stretch>
-        </p:blipFill>
-        <p:spPr>
-          <a:xfrm>
-            <a:off x="1753111" y="1772135"/>
-            <a:ext cx="5631832" cy="4146514"/>
-          </a:xfrm>
-        </p:spPr>
-      </p:pic>
-    </p:spTree>
-    <p:extLst>
-      <p:ext uri="{BB962C8B-B14F-4D97-AF65-F5344CB8AC3E}">
-        <p14:creationId xmlns:p14="http://schemas.microsoft.com/office/powerpoint/2010/main" val="3633823063"/>
-      </p:ext>
-    </p:extLst>
-  </p:cSld>
-  <p:clrMapOvr>
-    <a:masterClrMapping/>
-  </p:clrMapOvr>
-</p:sld>
-</file>
-
-<file path=ppt/slides/slide33.xml><?xml version="1.0" encoding="utf-8"?>
-<p:sld xmlns:a="http://schemas.openxmlformats.org/drawingml/2006/main" xmlns:r="http://schemas.openxmlformats.org/officeDocument/2006/relationships" xmlns:p="http://schemas.openxmlformats.org/presentationml/2006/main">
-  <p:cSld>
-    <p:spTree>
-      <p:nvGrpSpPr>
-        <p:cNvPr id="1" name=""/>
-        <p:cNvGrpSpPr/>
-        <p:nvPr/>
-      </p:nvGrpSpPr>
-      <p:grpSpPr>
-        <a:xfrm>
-          <a:off x="0" y="0"/>
-          <a:ext cx="0" cy="0"/>
-          <a:chOff x="0" y="0"/>
-          <a:chExt cx="0" cy="0"/>
-        </a:xfrm>
-      </p:grpSpPr>
-      <p:sp>
-        <p:nvSpPr>
-          <p:cNvPr id="2" name="Tittel 1"/>
-          <p:cNvSpPr>
-            <a:spLocks noGrp="1"/>
-          </p:cNvSpPr>
-          <p:nvPr>
-            <p:ph type="title"/>
-          </p:nvPr>
-        </p:nvSpPr>
-        <p:spPr/>
-        <p:txBody>
-          <a:bodyPr/>
-          <a:lstStyle/>
-          <a:p>
-            <a:r>
-              <a:rPr lang="en-GB" dirty="0" smtClean="0"/>
-              <a:t>Limitations</a:t>
-            </a:r>
-            <a:endParaRPr lang="en-GB" dirty="0"/>
-          </a:p>
-        </p:txBody>
-      </p:sp>
-      <p:sp>
-        <p:nvSpPr>
-          <p:cNvPr id="3" name="Plassholder for innhold 2"/>
-          <p:cNvSpPr>
-            <a:spLocks noGrp="1"/>
-          </p:cNvSpPr>
-          <p:nvPr>
-            <p:ph idx="1"/>
-          </p:nvPr>
-        </p:nvSpPr>
-        <p:spPr/>
-        <p:txBody>
-          <a:bodyPr/>
-          <a:lstStyle/>
-          <a:p>
-            <a:r>
-              <a:rPr lang="en-GB" dirty="0" smtClean="0"/>
-              <a:t>Thales has the military as a customer, so the code is confedential.</a:t>
-            </a:r>
-          </a:p>
-          <a:p>
-            <a:r>
-              <a:rPr lang="en-GB" dirty="0" smtClean="0"/>
-              <a:t>Wireshark’s lua integration is under development, and buggy.</a:t>
-            </a:r>
-          </a:p>
-          <a:p>
-            <a:endParaRPr lang="en-GB" dirty="0" smtClean="0"/>
-          </a:p>
-        </p:txBody>
-      </p:sp>
-    </p:spTree>
-    <p:extLst>
-      <p:ext uri="{BB962C8B-B14F-4D97-AF65-F5344CB8AC3E}">
-        <p14:creationId xmlns:p14="http://schemas.microsoft.com/office/powerpoint/2010/main" val="779040666"/>
-      </p:ext>
-    </p:extLst>
-  </p:cSld>
-  <p:clrMapOvr>
-    <a:masterClrMapping/>
-  </p:clrMapOvr>
-  <p:transition spd="slow">
-    <p:push dir="u"/>
-  </p:transition>
-  <p:timing>
-    <p:tnLst>
-      <p:par>
-        <p:cTn id="1" dur="indefinite" restart="never" nodeType="tmRoot"/>
-      </p:par>
-    </p:tnLst>
-  </p:timing>
-</p:sld>
-</file>
-
-<file path=ppt/slides/slide34.xml><?xml version="1.0" encoding="utf-8"?>
-<p:sld xmlns:a="http://schemas.openxmlformats.org/drawingml/2006/main" xmlns:r="http://schemas.openxmlformats.org/officeDocument/2006/relationships" xmlns:p="http://schemas.openxmlformats.org/presentationml/2006/main">
-  <p:cSld>
-    <p:spTree>
-      <p:nvGrpSpPr>
-        <p:cNvPr id="1" name=""/>
-        <p:cNvGrpSpPr/>
-        <p:nvPr/>
-      </p:nvGrpSpPr>
-      <p:grpSpPr>
-        <a:xfrm>
-          <a:off x="0" y="0"/>
-          <a:ext cx="0" cy="0"/>
-          <a:chOff x="0" y="0"/>
-          <a:chExt cx="0" cy="0"/>
-        </a:xfrm>
-      </p:grpSpPr>
-      <p:sp>
-        <p:nvSpPr>
-          <p:cNvPr id="2" name="Tittel 1"/>
-          <p:cNvSpPr>
-            <a:spLocks noGrp="1"/>
-          </p:cNvSpPr>
-          <p:nvPr>
-            <p:ph type="title"/>
-          </p:nvPr>
-        </p:nvSpPr>
-        <p:spPr/>
-        <p:txBody>
-          <a:bodyPr/>
-          <a:lstStyle/>
-          <a:p>
-            <a:r>
               <a:rPr lang="en-GB" dirty="0" smtClean="0"/>
               <a:t>CSjark</a:t>
             </a:r>
@@ -7207,20 +6757,20 @@
   <p:clrMapOvr>
     <a:masterClrMapping/>
   </p:clrMapOvr>
-  <p:transition spd="slow">
+  <p:transition xmlns:p14="http://schemas.microsoft.com/office/powerpoint/2010/main" spd="slow">
     <p:push dir="u"/>
   </p:transition>
   <p:timing>
     <p:tnLst>
       <p:par>
-        <p:cTn id="1" dur="indefinite" restart="never" nodeType="tmRoot"/>
+        <p:cTn xmlns:p14="http://schemas.microsoft.com/office/powerpoint/2010/main" id="1" dur="indefinite" restart="never" nodeType="tmRoot"/>
       </p:par>
     </p:tnLst>
   </p:timing>
 </p:sld>
 </file>
 
-<file path=ppt/slides/slide35.xml><?xml version="1.0" encoding="utf-8"?>
+<file path=ppt/slides/slide32.xml><?xml version="1.0" encoding="utf-8"?>
 <p:sld xmlns:a="http://schemas.openxmlformats.org/drawingml/2006/main" xmlns:r="http://schemas.openxmlformats.org/officeDocument/2006/relationships" xmlns:p="http://schemas.openxmlformats.org/presentationml/2006/main">
   <p:cSld>
     <p:spTree>
@@ -7801,20 +7351,20 @@
   <p:clrMapOvr>
     <a:masterClrMapping/>
   </p:clrMapOvr>
-  <p:transition spd="slow">
+  <p:transition xmlns:p14="http://schemas.microsoft.com/office/powerpoint/2010/main" spd="slow">
     <p:push dir="u"/>
   </p:transition>
   <p:timing>
     <p:tnLst>
       <p:par>
-        <p:cTn id="1" dur="indefinite" restart="never" nodeType="tmRoot"/>
+        <p:cTn xmlns:p14="http://schemas.microsoft.com/office/powerpoint/2010/main" id="1" dur="indefinite" restart="never" nodeType="tmRoot"/>
       </p:par>
     </p:tnLst>
   </p:timing>
 </p:sld>
 </file>
 
-<file path=ppt/slides/slide36.xml><?xml version="1.0" encoding="utf-8"?>
+<file path=ppt/slides/slide33.xml><?xml version="1.0" encoding="utf-8"?>
 <p:sld xmlns:a="http://schemas.openxmlformats.org/drawingml/2006/main" xmlns:r="http://schemas.openxmlformats.org/officeDocument/2006/relationships" xmlns:p="http://schemas.openxmlformats.org/presentationml/2006/main">
   <p:cSld>
     <p:spTree>
@@ -7928,20 +7478,20 @@
   <p:clrMapOvr>
     <a:masterClrMapping/>
   </p:clrMapOvr>
-  <p:transition spd="slow">
+  <p:transition xmlns:p14="http://schemas.microsoft.com/office/powerpoint/2010/main" spd="slow">
     <p:push dir="u"/>
   </p:transition>
   <p:timing>
     <p:tnLst>
       <p:par>
-        <p:cTn id="1" dur="indefinite" restart="never" nodeType="tmRoot"/>
+        <p:cTn xmlns:p14="http://schemas.microsoft.com/office/powerpoint/2010/main" id="1" dur="indefinite" restart="never" nodeType="tmRoot"/>
       </p:par>
     </p:tnLst>
   </p:timing>
 </p:sld>
 </file>
 
-<file path=ppt/slides/slide37.xml><?xml version="1.0" encoding="utf-8"?>
+<file path=ppt/slides/slide34.xml><?xml version="1.0" encoding="utf-8"?>
 <p:sld xmlns:a="http://schemas.openxmlformats.org/drawingml/2006/main" xmlns:r="http://schemas.openxmlformats.org/officeDocument/2006/relationships" xmlns:p="http://schemas.openxmlformats.org/presentationml/2006/main">
   <p:cSld>
     <p:spTree>
@@ -8045,20 +7595,20 @@
   <p:clrMapOvr>
     <a:masterClrMapping/>
   </p:clrMapOvr>
-  <p:transition spd="slow">
+  <p:transition xmlns:p14="http://schemas.microsoft.com/office/powerpoint/2010/main" spd="slow">
     <p:push dir="u"/>
   </p:transition>
   <p:timing>
     <p:tnLst>
       <p:par>
-        <p:cTn id="1" dur="indefinite" restart="never" nodeType="tmRoot"/>
+        <p:cTn xmlns:p14="http://schemas.microsoft.com/office/powerpoint/2010/main" id="1" dur="indefinite" restart="never" nodeType="tmRoot"/>
       </p:par>
     </p:tnLst>
   </p:timing>
 </p:sld>
 </file>
 
-<file path=ppt/slides/slide38.xml><?xml version="1.0" encoding="utf-8"?>
+<file path=ppt/slides/slide35.xml><?xml version="1.0" encoding="utf-8"?>
 <p:sld xmlns:a="http://schemas.openxmlformats.org/drawingml/2006/main" xmlns:r="http://schemas.openxmlformats.org/officeDocument/2006/relationships" xmlns:p="http://schemas.openxmlformats.org/presentationml/2006/main">
   <p:cSld>
     <p:spTree>
@@ -8172,20 +7722,20 @@
   <p:clrMapOvr>
     <a:masterClrMapping/>
   </p:clrMapOvr>
-  <p:transition spd="slow">
+  <p:transition xmlns:p14="http://schemas.microsoft.com/office/powerpoint/2010/main" spd="slow">
     <p:push dir="u"/>
   </p:transition>
   <p:timing>
     <p:tnLst>
       <p:par>
-        <p:cTn id="1" dur="indefinite" restart="never" nodeType="tmRoot"/>
+        <p:cTn xmlns:p14="http://schemas.microsoft.com/office/powerpoint/2010/main" id="1" dur="indefinite" restart="never" nodeType="tmRoot"/>
       </p:par>
     </p:tnLst>
   </p:timing>
 </p:sld>
 </file>
 
-<file path=ppt/slides/slide39.xml><?xml version="1.0" encoding="utf-8"?>
+<file path=ppt/slides/slide36.xml><?xml version="1.0" encoding="utf-8"?>
 <p:sld xmlns:a="http://schemas.openxmlformats.org/drawingml/2006/main" xmlns:r="http://schemas.openxmlformats.org/officeDocument/2006/relationships" xmlns:p="http://schemas.openxmlformats.org/presentationml/2006/main">
   <p:cSld>
     <p:spTree>
@@ -8304,131 +7854,20 @@
   <p:clrMapOvr>
     <a:masterClrMapping/>
   </p:clrMapOvr>
-  <p:transition spd="slow">
+  <p:transition xmlns:p14="http://schemas.microsoft.com/office/powerpoint/2010/main" spd="slow">
     <p:push dir="u"/>
   </p:transition>
   <p:timing>
     <p:tnLst>
       <p:par>
-        <p:cTn id="1" dur="indefinite" restart="never" nodeType="tmRoot"/>
+        <p:cTn xmlns:p14="http://schemas.microsoft.com/office/powerpoint/2010/main" id="1" dur="indefinite" restart="never" nodeType="tmRoot"/>
       </p:par>
     </p:tnLst>
   </p:timing>
 </p:sld>
 </file>
 
-<file path=ppt/slides/slide4.xml><?xml version="1.0" encoding="utf-8"?>
-<p:sld xmlns:a="http://schemas.openxmlformats.org/drawingml/2006/main" xmlns:r="http://schemas.openxmlformats.org/officeDocument/2006/relationships" xmlns:p="http://schemas.openxmlformats.org/presentationml/2006/main">
-  <p:cSld>
-    <p:spTree>
-      <p:nvGrpSpPr>
-        <p:cNvPr id="1" name=""/>
-        <p:cNvGrpSpPr/>
-        <p:nvPr/>
-      </p:nvGrpSpPr>
-      <p:grpSpPr>
-        <a:xfrm>
-          <a:off x="0" y="0"/>
-          <a:ext cx="0" cy="0"/>
-          <a:chOff x="0" y="0"/>
-          <a:chExt cx="0" cy="0"/>
-        </a:xfrm>
-      </p:grpSpPr>
-      <p:sp>
-        <p:nvSpPr>
-          <p:cNvPr id="2" name="Tittel 1"/>
-          <p:cNvSpPr>
-            <a:spLocks noGrp="1"/>
-          </p:cNvSpPr>
-          <p:nvPr>
-            <p:ph type="title"/>
-          </p:nvPr>
-        </p:nvSpPr>
-        <p:spPr/>
-        <p:txBody>
-          <a:bodyPr/>
-          <a:lstStyle/>
-          <a:p>
-            <a:r>
-              <a:rPr lang="nb-NO" dirty="0" smtClean="0"/>
-              <a:t>Group goals</a:t>
-            </a:r>
-            <a:endParaRPr lang="nb-NO" dirty="0"/>
-          </a:p>
-        </p:txBody>
-      </p:sp>
-      <p:sp>
-        <p:nvSpPr>
-          <p:cNvPr id="3" name="Plassholder for innhold 2"/>
-          <p:cNvSpPr>
-            <a:spLocks noGrp="1"/>
-          </p:cNvSpPr>
-          <p:nvPr>
-            <p:ph idx="1"/>
-          </p:nvPr>
-        </p:nvSpPr>
-        <p:spPr/>
-        <p:txBody>
-          <a:bodyPr/>
-          <a:lstStyle/>
-          <a:p>
-            <a:r>
-              <a:rPr lang="en-GB" dirty="0" smtClean="0"/>
-              <a:t>Improve programming skills.</a:t>
-            </a:r>
-          </a:p>
-          <a:p>
-            <a:r>
-              <a:rPr lang="en-GB" dirty="0" smtClean="0"/>
-              <a:t>Learn to develop software efficiently.</a:t>
-            </a:r>
-          </a:p>
-          <a:p>
-            <a:r>
-              <a:rPr lang="en-GB" dirty="0" smtClean="0"/>
-              <a:t>Learn to work in a realistic </a:t>
-            </a:r>
-            <a:r>
-              <a:rPr lang="en-GB" dirty="0" err="1" smtClean="0"/>
-              <a:t>enviroment</a:t>
-            </a:r>
-            <a:r>
-              <a:rPr lang="en-GB" dirty="0" smtClean="0"/>
-              <a:t>.</a:t>
-            </a:r>
-          </a:p>
-          <a:p>
-            <a:r>
-              <a:rPr lang="en-GB" dirty="0" smtClean="0"/>
-              <a:t>To fulfil the needs of the customer.</a:t>
-            </a:r>
-          </a:p>
-        </p:txBody>
-      </p:sp>
-    </p:spTree>
-    <p:extLst>
-      <p:ext uri="{BB962C8B-B14F-4D97-AF65-F5344CB8AC3E}">
-        <p14:creationId xmlns:p14="http://schemas.microsoft.com/office/powerpoint/2010/main" val="4179239219"/>
-      </p:ext>
-    </p:extLst>
-  </p:cSld>
-  <p:clrMapOvr>
-    <a:masterClrMapping/>
-  </p:clrMapOvr>
-  <p:transition spd="slow">
-    <p:push dir="u"/>
-  </p:transition>
-  <p:timing>
-    <p:tnLst>
-      <p:par>
-        <p:cTn id="1" dur="indefinite" restart="never" nodeType="tmRoot"/>
-      </p:par>
-    </p:tnLst>
-  </p:timing>
-</p:sld>
-</file>
-
-<file path=ppt/slides/slide40.xml><?xml version="1.0" encoding="utf-8"?>
+<file path=ppt/slides/slide37.xml><?xml version="1.0" encoding="utf-8"?>
 <p:sld xmlns:a="http://schemas.openxmlformats.org/drawingml/2006/main" xmlns:r="http://schemas.openxmlformats.org/officeDocument/2006/relationships" xmlns:p="http://schemas.openxmlformats.org/presentationml/2006/main">
   <p:cSld>
     <p:spTree>
@@ -8544,20 +7983,20 @@
   <p:clrMapOvr>
     <a:masterClrMapping/>
   </p:clrMapOvr>
-  <p:transition spd="slow">
+  <p:transition xmlns:p14="http://schemas.microsoft.com/office/powerpoint/2010/main" spd="slow">
     <p:push dir="u"/>
   </p:transition>
   <p:timing>
     <p:tnLst>
       <p:par>
-        <p:cTn id="1" dur="indefinite" restart="never" nodeType="tmRoot"/>
+        <p:cTn xmlns:p14="http://schemas.microsoft.com/office/powerpoint/2010/main" id="1" dur="indefinite" restart="never" nodeType="tmRoot"/>
       </p:par>
     </p:tnLst>
   </p:timing>
 </p:sld>
 </file>
 
-<file path=ppt/slides/slide41.xml><?xml version="1.0" encoding="utf-8"?>
+<file path=ppt/slides/slide38.xml><?xml version="1.0" encoding="utf-8"?>
 <p:sld xmlns:a="http://schemas.openxmlformats.org/drawingml/2006/main" xmlns:r="http://schemas.openxmlformats.org/officeDocument/2006/relationships" xmlns:p="http://schemas.openxmlformats.org/presentationml/2006/main">
   <p:cSld>
     <p:spTree>
@@ -8665,20 +8104,20 @@
   <p:clrMapOvr>
     <a:masterClrMapping/>
   </p:clrMapOvr>
-  <p:transition spd="slow">
+  <p:transition xmlns:p14="http://schemas.microsoft.com/office/powerpoint/2010/main" spd="slow">
     <p:push dir="u"/>
   </p:transition>
   <p:timing>
     <p:tnLst>
       <p:par>
-        <p:cTn id="1" dur="indefinite" restart="never" nodeType="tmRoot"/>
+        <p:cTn xmlns:p14="http://schemas.microsoft.com/office/powerpoint/2010/main" id="1" dur="indefinite" restart="never" nodeType="tmRoot"/>
       </p:par>
     </p:tnLst>
   </p:timing>
 </p:sld>
 </file>
 
-<file path=ppt/slides/slide42.xml><?xml version="1.0" encoding="utf-8"?>
+<file path=ppt/slides/slide39.xml><?xml version="1.0" encoding="utf-8"?>
 <p:sld xmlns:a="http://schemas.openxmlformats.org/drawingml/2006/main" xmlns:r="http://schemas.openxmlformats.org/officeDocument/2006/relationships" xmlns:p="http://schemas.openxmlformats.org/presentationml/2006/main">
   <p:cSld>
     <p:spTree>
@@ -8777,13 +8216,124 @@
   <p:clrMapOvr>
     <a:masterClrMapping/>
   </p:clrMapOvr>
-  <p:transition spd="slow">
+  <p:transition xmlns:p14="http://schemas.microsoft.com/office/powerpoint/2010/main" spd="slow">
     <p:push dir="u"/>
   </p:transition>
   <p:timing>
     <p:tnLst>
       <p:par>
-        <p:cTn id="1" dur="indefinite" restart="never" nodeType="tmRoot"/>
+        <p:cTn xmlns:p14="http://schemas.microsoft.com/office/powerpoint/2010/main" id="1" dur="indefinite" restart="never" nodeType="tmRoot"/>
+      </p:par>
+    </p:tnLst>
+  </p:timing>
+</p:sld>
+</file>
+
+<file path=ppt/slides/slide4.xml><?xml version="1.0" encoding="utf-8"?>
+<p:sld xmlns:a="http://schemas.openxmlformats.org/drawingml/2006/main" xmlns:r="http://schemas.openxmlformats.org/officeDocument/2006/relationships" xmlns:p="http://schemas.openxmlformats.org/presentationml/2006/main">
+  <p:cSld>
+    <p:spTree>
+      <p:nvGrpSpPr>
+        <p:cNvPr id="1" name=""/>
+        <p:cNvGrpSpPr/>
+        <p:nvPr/>
+      </p:nvGrpSpPr>
+      <p:grpSpPr>
+        <a:xfrm>
+          <a:off x="0" y="0"/>
+          <a:ext cx="0" cy="0"/>
+          <a:chOff x="0" y="0"/>
+          <a:chExt cx="0" cy="0"/>
+        </a:xfrm>
+      </p:grpSpPr>
+      <p:sp>
+        <p:nvSpPr>
+          <p:cNvPr id="2" name="Tittel 1"/>
+          <p:cNvSpPr>
+            <a:spLocks noGrp="1"/>
+          </p:cNvSpPr>
+          <p:nvPr>
+            <p:ph type="title"/>
+          </p:nvPr>
+        </p:nvSpPr>
+        <p:spPr/>
+        <p:txBody>
+          <a:bodyPr/>
+          <a:lstStyle/>
+          <a:p>
+            <a:r>
+              <a:rPr lang="nb-NO" dirty="0" smtClean="0"/>
+              <a:t>Group goals</a:t>
+            </a:r>
+            <a:endParaRPr lang="nb-NO" dirty="0"/>
+          </a:p>
+        </p:txBody>
+      </p:sp>
+      <p:sp>
+        <p:nvSpPr>
+          <p:cNvPr id="3" name="Plassholder for innhold 2"/>
+          <p:cNvSpPr>
+            <a:spLocks noGrp="1"/>
+          </p:cNvSpPr>
+          <p:nvPr>
+            <p:ph idx="1"/>
+          </p:nvPr>
+        </p:nvSpPr>
+        <p:spPr/>
+        <p:txBody>
+          <a:bodyPr/>
+          <a:lstStyle/>
+          <a:p>
+            <a:r>
+              <a:rPr lang="en-GB" dirty="0" smtClean="0"/>
+              <a:t>Improve programming skills.</a:t>
+            </a:r>
+          </a:p>
+          <a:p>
+            <a:r>
+              <a:rPr lang="en-GB" dirty="0" smtClean="0"/>
+              <a:t>Learn to develop software efficiently.</a:t>
+            </a:r>
+          </a:p>
+          <a:p>
+            <a:r>
+              <a:rPr lang="en-GB" dirty="0" smtClean="0"/>
+              <a:t>Learn to work in a realistic </a:t>
+            </a:r>
+            <a:r>
+              <a:rPr lang="en-GB" dirty="0" err="1" smtClean="0"/>
+              <a:t>enviroment</a:t>
+            </a:r>
+            <a:r>
+              <a:rPr lang="en-GB" dirty="0" smtClean="0"/>
+              <a:t>.</a:t>
+            </a:r>
+          </a:p>
+          <a:p>
+            <a:r>
+              <a:rPr lang="en-GB" dirty="0" smtClean="0"/>
+              <a:t>To fulfil the needs of the customer.</a:t>
+            </a:r>
+          </a:p>
+        </p:txBody>
+      </p:sp>
+    </p:spTree>
+    <p:extLst>
+      <p:ext uri="{BB962C8B-B14F-4D97-AF65-F5344CB8AC3E}">
+        <p14:creationId xmlns:p14="http://schemas.microsoft.com/office/powerpoint/2010/main" val="4179239219"/>
+      </p:ext>
+    </p:extLst>
+  </p:cSld>
+  <p:clrMapOvr>
+    <a:masterClrMapping/>
+  </p:clrMapOvr>
+  <p:transition xmlns:p14="http://schemas.microsoft.com/office/powerpoint/2010/main" spd="slow">
+    <p:push dir="u"/>
+  </p:transition>
+  <p:timing>
+    <p:tnLst>
+      <p:par>
+        <p:cTn xmlns:p14="http://schemas.microsoft.com/office/powerpoint/2010/main" id="1" dur="indefinite" restart="never" nodeType="tmRoot"/>
       </p:par>
     </p:tnLst>
   </p:timing>
@@ -9009,13 +8559,13 @@
   <p:clrMapOvr>
     <a:masterClrMapping/>
   </p:clrMapOvr>
-  <p:transition spd="slow">
+  <p:transition xmlns:p14="http://schemas.microsoft.com/office/powerpoint/2010/main" spd="slow">
     <p:push dir="u"/>
   </p:transition>
   <p:timing>
     <p:tnLst>
       <p:par>
-        <p:cTn id="1" dur="indefinite" restart="never" nodeType="tmRoot"/>
+        <p:cTn xmlns:p14="http://schemas.microsoft.com/office/powerpoint/2010/main" id="1" dur="indefinite" restart="never" nodeType="tmRoot"/>
       </p:par>
     </p:tnLst>
   </p:timing>
@@ -9023,6 +8573,88 @@
 </file>
 
 <file path=ppt/slides/slide7.xml><?xml version="1.0" encoding="utf-8"?>
+<p:sld xmlns:a="http://schemas.openxmlformats.org/drawingml/2006/main" xmlns:r="http://schemas.openxmlformats.org/officeDocument/2006/relationships" xmlns:p="http://schemas.openxmlformats.org/presentationml/2006/main">
+  <p:cSld>
+    <p:spTree>
+      <p:nvGrpSpPr>
+        <p:cNvPr id="1" name=""/>
+        <p:cNvGrpSpPr/>
+        <p:nvPr/>
+      </p:nvGrpSpPr>
+      <p:grpSpPr>
+        <a:xfrm>
+          <a:off x="0" y="0"/>
+          <a:ext cx="0" cy="0"/>
+          <a:chOff x="0" y="0"/>
+          <a:chExt cx="0" cy="0"/>
+        </a:xfrm>
+      </p:grpSpPr>
+      <p:sp>
+        <p:nvSpPr>
+          <p:cNvPr id="2" name="Tittel 1"/>
+          <p:cNvSpPr>
+            <a:spLocks noGrp="1"/>
+          </p:cNvSpPr>
+          <p:nvPr>
+            <p:ph type="title"/>
+          </p:nvPr>
+        </p:nvSpPr>
+        <p:spPr/>
+        <p:txBody>
+          <a:bodyPr/>
+          <a:lstStyle/>
+          <a:p>
+            <a:r>
+              <a:rPr lang="nb-NO" dirty="0" smtClean="0"/>
+              <a:t>Wireshark</a:t>
+            </a:r>
+            <a:endParaRPr lang="en-GB" dirty="0"/>
+          </a:p>
+        </p:txBody>
+      </p:sp>
+      <p:pic>
+        <p:nvPicPr>
+          <p:cNvPr id="4" name="Plassholder for innhold 3"/>
+          <p:cNvPicPr>
+            <a:picLocks noGrp="1" noChangeAspect="1"/>
+          </p:cNvPicPr>
+          <p:nvPr>
+            <p:ph idx="1"/>
+          </p:nvPr>
+        </p:nvPicPr>
+        <p:blipFill>
+          <a:blip r:embed="rId2">
+            <a:extLst>
+              <a:ext uri="{28A0092B-C50C-407E-A947-70E740481C1C}">
+                <a14:useLocalDpi xmlns:a14="http://schemas.microsoft.com/office/drawing/2010/main" val="0"/>
+              </a:ext>
+            </a:extLst>
+          </a:blip>
+          <a:stretch>
+            <a:fillRect/>
+          </a:stretch>
+        </p:blipFill>
+        <p:spPr>
+          <a:xfrm>
+            <a:off x="1627322" y="1357487"/>
+            <a:ext cx="5943599" cy="5418028"/>
+          </a:xfrm>
+        </p:spPr>
+      </p:pic>
+    </p:spTree>
+    <p:extLst>
+      <p:ext uri="{BB962C8B-B14F-4D97-AF65-F5344CB8AC3E}">
+        <p14:creationId xmlns:p14="http://schemas.microsoft.com/office/powerpoint/2010/main" val="871341481"/>
+      </p:ext>
+    </p:extLst>
+  </p:cSld>
+  <p:clrMapOvr>
+    <a:masterClrMapping/>
+  </p:clrMapOvr>
+</p:sld>
+</file>
+
+<file path=ppt/slides/slide8.xml><?xml version="1.0" encoding="utf-8"?>
 <p:sld xmlns:a="http://schemas.openxmlformats.org/drawingml/2006/main" xmlns:r="http://schemas.openxmlformats.org/officeDocument/2006/relationships" xmlns:p="http://schemas.openxmlformats.org/presentationml/2006/main">
   <p:cSld>
     <p:spTree>
@@ -9165,8 +8797,8 @@
         </p:nvSpPr>
         <p:spPr>
           <a:xfrm>
-            <a:off x="741974" y="1456839"/>
-            <a:ext cx="1844299" cy="1495587"/>
+            <a:off x="581186" y="1456839"/>
+            <a:ext cx="2059158" cy="1495587"/>
           </a:xfrm>
           <a:prstGeom prst="roundRect">
             <a:avLst/>
@@ -9210,7 +8842,15 @@
           <a:p>
             <a:r>
               <a:rPr lang="nb-NO" sz="1600" dirty="0"/>
-              <a:t>  char* =  ‘abc</a:t>
+              <a:t>  char* </a:t>
+            </a:r>
+            <a:r>
+              <a:rPr lang="nb-NO" sz="1600" dirty="0" smtClean="0"/>
+              <a:t>c =  </a:t>
+            </a:r>
+            <a:r>
+              <a:rPr lang="nb-NO" sz="1600" dirty="0"/>
+              <a:t>‘abc</a:t>
             </a:r>
             <a:r>
               <a:rPr lang="nb-NO" sz="1600" dirty="0" smtClean="0"/>
@@ -9260,30 +8900,62 @@
           <a:lstStyle/>
           <a:p>
             <a:r>
-              <a:rPr lang="nb-NO" sz="1600" dirty="0"/>
-              <a:t>struct message {</a:t>
-            </a:r>
-          </a:p>
-          <a:p>
-            <a:r>
-              <a:rPr lang="nb-NO" sz="1600" dirty="0"/>
-              <a:t>  int a = 5;</a:t>
-            </a:r>
-          </a:p>
-          <a:p>
-            <a:r>
-              <a:rPr lang="nb-NO" sz="1600" dirty="0"/>
-              <a:t>  int b = 6;</a:t>
-            </a:r>
-          </a:p>
-          <a:p>
-            <a:r>
-              <a:rPr lang="nb-NO" sz="1600" dirty="0"/>
-              <a:t>  char* =  ‘abc</a:t>
+              <a:rPr lang="nb-NO" sz="1600" dirty="0" err="1" smtClean="0"/>
+              <a:t>struct</a:t>
             </a:r>
             <a:r>
               <a:rPr lang="nb-NO" sz="1600" dirty="0" smtClean="0"/>
-              <a:t>’;</a:t>
+              <a:t> </a:t>
+            </a:r>
+            <a:r>
+              <a:rPr lang="nb-NO" sz="1600" dirty="0" err="1" smtClean="0"/>
+              <a:t>message</a:t>
+            </a:r>
+            <a:r>
+              <a:rPr lang="nb-NO" sz="1600" dirty="0" smtClean="0"/>
+              <a:t> {</a:t>
+            </a:r>
+          </a:p>
+          <a:p>
+            <a:r>
+              <a:rPr lang="nb-NO" sz="1600" dirty="0" smtClean="0"/>
+              <a:t>  </a:t>
+            </a:r>
+            <a:r>
+              <a:rPr lang="nb-NO" sz="1600" dirty="0" err="1" smtClean="0"/>
+              <a:t>int</a:t>
+            </a:r>
+            <a:r>
+              <a:rPr lang="nb-NO" sz="1600" dirty="0" smtClean="0"/>
+              <a:t> a = 5;</a:t>
+            </a:r>
+          </a:p>
+          <a:p>
+            <a:r>
+              <a:rPr lang="nb-NO" sz="1600" dirty="0" smtClean="0"/>
+              <a:t>  </a:t>
+            </a:r>
+            <a:r>
+              <a:rPr lang="nb-NO" sz="1600" dirty="0" err="1" smtClean="0"/>
+              <a:t>int</a:t>
+            </a:r>
+            <a:r>
+              <a:rPr lang="nb-NO" sz="1600" dirty="0" smtClean="0"/>
+              <a:t> b = 6;</a:t>
+            </a:r>
+          </a:p>
+          <a:p>
+            <a:r>
+              <a:rPr lang="nb-NO" sz="1600" dirty="0" smtClean="0"/>
+              <a:t>  </a:t>
+            </a:r>
+            <a:r>
+              <a:rPr lang="nb-NO" sz="1600" dirty="0" err="1" smtClean="0"/>
+              <a:t>char</a:t>
+            </a:r>
+            <a:r>
+              <a:rPr lang="nb-NO" sz="1600" dirty="0" smtClean="0"/>
+              <a:t>* =  ‘abc’;</a:t>
             </a:r>
           </a:p>
           <a:p>
@@ -9535,13 +9207,13 @@
   <p:clrMapOvr>
     <a:masterClrMapping/>
   </p:clrMapOvr>
-  <p:transition spd="slow">
+  <p:transition xmlns:p14="http://schemas.microsoft.com/office/powerpoint/2010/main" spd="slow">
     <p:push dir="u"/>
   </p:transition>
   <p:timing>
     <p:tnLst>
       <p:par>
-        <p:cTn id="1" dur="indefinite" restart="never" nodeType="tmRoot">
+        <p:cTn xmlns:p14="http://schemas.microsoft.com/office/powerpoint/2010/main" id="1" dur="indefinite" restart="never" nodeType="tmRoot">
           <p:childTnLst>
             <p:seq concurrent="1" nextAc="seek">
               <p:cTn id="2" dur="indefinite" nodeType="mainSeq">
@@ -9901,126 +9573,6 @@
 </p:sld>
 </file>
 
-<file path=ppt/slides/slide8.xml><?xml version="1.0" encoding="utf-8"?>
-<p:sld xmlns:a="http://schemas.openxmlformats.org/drawingml/2006/main" xmlns:r="http://schemas.openxmlformats.org/officeDocument/2006/relationships" xmlns:p="http://schemas.openxmlformats.org/presentationml/2006/main">
-  <p:cSld>
-    <p:spTree>
-      <p:nvGrpSpPr>
-        <p:cNvPr id="1" name=""/>
-        <p:cNvGrpSpPr/>
-        <p:nvPr/>
-      </p:nvGrpSpPr>
-      <p:grpSpPr>
-        <a:xfrm>
-          <a:off x="0" y="0"/>
-          <a:ext cx="0" cy="0"/>
-          <a:chOff x="0" y="0"/>
-          <a:chExt cx="0" cy="0"/>
-        </a:xfrm>
-      </p:grpSpPr>
-      <p:sp>
-        <p:nvSpPr>
-          <p:cNvPr id="2" name="Tittel 1"/>
-          <p:cNvSpPr>
-            <a:spLocks noGrp="1"/>
-          </p:cNvSpPr>
-          <p:nvPr>
-            <p:ph type="title"/>
-          </p:nvPr>
-        </p:nvSpPr>
-        <p:spPr/>
-        <p:txBody>
-          <a:bodyPr/>
-          <a:lstStyle/>
-          <a:p>
-            <a:r>
-              <a:rPr lang="nb-NO" dirty="0" smtClean="0"/>
-              <a:t>Dissectors</a:t>
-            </a:r>
-            <a:endParaRPr lang="nb-NO" dirty="0"/>
-          </a:p>
-        </p:txBody>
-      </p:sp>
-      <p:sp>
-        <p:nvSpPr>
-          <p:cNvPr id="3" name="Plassholder for innhold 2"/>
-          <p:cNvSpPr>
-            <a:spLocks noGrp="1"/>
-          </p:cNvSpPr>
-          <p:nvPr>
-            <p:ph idx="1"/>
-          </p:nvPr>
-        </p:nvSpPr>
-        <p:spPr/>
-        <p:txBody>
-          <a:bodyPr/>
-          <a:lstStyle/>
-          <a:p>
-            <a:r>
-              <a:rPr lang="nb-NO" dirty="0" smtClean="0"/>
-              <a:t>Wireshark can be extended with dissectors.</a:t>
-            </a:r>
-          </a:p>
-          <a:p>
-            <a:r>
-              <a:rPr lang="nb-NO" dirty="0" smtClean="0"/>
-              <a:t>A dissector knows the structure of the message</a:t>
-            </a:r>
-            <a:r>
-              <a:rPr lang="nb-NO" dirty="0"/>
-              <a:t> </a:t>
-            </a:r>
-            <a:r>
-              <a:rPr lang="nb-NO" dirty="0" smtClean="0"/>
-              <a:t>and and can represent it beautifully.</a:t>
-            </a:r>
-          </a:p>
-          <a:p>
-            <a:r>
-              <a:rPr lang="nb-NO" dirty="0" smtClean="0"/>
-              <a:t>Takes from 15 minutes – 1 hour to make.</a:t>
-            </a:r>
-          </a:p>
-          <a:p>
-            <a:r>
-              <a:rPr lang="nb-NO" dirty="0" smtClean="0"/>
-              <a:t>Hard or and tideous for large and complex structs.</a:t>
-            </a:r>
-          </a:p>
-          <a:p>
-            <a:r>
-              <a:rPr lang="nb-NO" dirty="0" smtClean="0"/>
-              <a:t>Requires knowledge about C memory layout and Wireshark API.</a:t>
-            </a:r>
-          </a:p>
-          <a:p>
-            <a:endParaRPr lang="nb-NO" dirty="0"/>
-          </a:p>
-        </p:txBody>
-      </p:sp>
-    </p:spTree>
-    <p:extLst>
-      <p:ext uri="{BB962C8B-B14F-4D97-AF65-F5344CB8AC3E}">
-        <p14:creationId xmlns:p14="http://schemas.microsoft.com/office/powerpoint/2010/main" val="2832160107"/>
-      </p:ext>
-    </p:extLst>
-  </p:cSld>
-  <p:clrMapOvr>
-    <a:masterClrMapping/>
-  </p:clrMapOvr>
-  <p:transition spd="slow">
-    <p:push dir="u"/>
-  </p:transition>
-  <p:timing>
-    <p:tnLst>
-      <p:par>
-        <p:cTn id="1" dur="indefinite" restart="never" nodeType="tmRoot"/>
-      </p:par>
-    </p:tnLst>
-  </p:timing>
-</p:sld>
-</file>
-
 <file path=ppt/slides/slide9.xml><?xml version="1.0" encoding="utf-8"?>
 <p:sld xmlns:a="http://schemas.openxmlformats.org/drawingml/2006/main" xmlns:r="http://schemas.openxmlformats.org/officeDocument/2006/relationships" xmlns:p="http://schemas.openxmlformats.org/presentationml/2006/main">
   <p:cSld>
@@ -10055,51 +9607,89 @@
           <a:p>
             <a:r>
               <a:rPr lang="nb-NO" dirty="0" smtClean="0"/>
-              <a:t>Wireshark</a:t>
-            </a:r>
-            <a:endParaRPr lang="en-GB" dirty="0"/>
-          </a:p>
-        </p:txBody>
-      </p:sp>
-      <p:pic>
-        <p:nvPicPr>
-          <p:cNvPr id="4" name="Plassholder for innhold 3"/>
-          <p:cNvPicPr>
-            <a:picLocks noGrp="1" noChangeAspect="1"/>
-          </p:cNvPicPr>
+              <a:t>Dissectors</a:t>
+            </a:r>
+            <a:endParaRPr lang="nb-NO" dirty="0"/>
+          </a:p>
+        </p:txBody>
+      </p:sp>
+      <p:sp>
+        <p:nvSpPr>
+          <p:cNvPr id="3" name="Plassholder for innhold 2"/>
+          <p:cNvSpPr>
+            <a:spLocks noGrp="1"/>
+          </p:cNvSpPr>
           <p:nvPr>
             <p:ph idx="1"/>
           </p:nvPr>
-        </p:nvPicPr>
-        <p:blipFill>
-          <a:blip r:embed="rId2">
-            <a:extLst>
-              <a:ext uri="{28A0092B-C50C-407E-A947-70E740481C1C}">
-                <a14:useLocalDpi xmlns:a14="http://schemas.microsoft.com/office/drawing/2010/main" val="0"/>
-              </a:ext>
-            </a:extLst>
-          </a:blip>
-          <a:stretch>
-            <a:fillRect/>
-          </a:stretch>
-        </p:blipFill>
-        <p:spPr>
-          <a:xfrm>
-            <a:off x="1627322" y="1357487"/>
-            <a:ext cx="5943599" cy="5418028"/>
-          </a:xfrm>
-        </p:spPr>
-      </p:pic>
+        </p:nvSpPr>
+        <p:spPr/>
+        <p:txBody>
+          <a:bodyPr/>
+          <a:lstStyle/>
+          <a:p>
+            <a:r>
+              <a:rPr lang="nb-NO" dirty="0" smtClean="0"/>
+              <a:t>Wireshark can be extended with dissectors.</a:t>
+            </a:r>
+          </a:p>
+          <a:p>
+            <a:r>
+              <a:rPr lang="nb-NO" dirty="0" smtClean="0"/>
+              <a:t>A dissector knows the structure of the message</a:t>
+            </a:r>
+            <a:r>
+              <a:rPr lang="nb-NO" dirty="0"/>
+              <a:t> </a:t>
+            </a:r>
+            <a:r>
+              <a:rPr lang="nb-NO" dirty="0" smtClean="0"/>
+              <a:t>and and can represent it beautifully.</a:t>
+            </a:r>
+          </a:p>
+          <a:p>
+            <a:r>
+              <a:rPr lang="nb-NO" dirty="0" smtClean="0"/>
+              <a:t>Takes from 15 minutes – 1 hour to make.</a:t>
+            </a:r>
+          </a:p>
+          <a:p>
+            <a:r>
+              <a:rPr lang="nb-NO" dirty="0" smtClean="0"/>
+              <a:t>Hard or and tideous for large and complex structs.</a:t>
+            </a:r>
+          </a:p>
+          <a:p>
+            <a:r>
+              <a:rPr lang="nb-NO" dirty="0" smtClean="0"/>
+              <a:t>Requires knowledge about C memory layout and Wireshark API.</a:t>
+            </a:r>
+          </a:p>
+          <a:p>
+            <a:endParaRPr lang="nb-NO" dirty="0"/>
+          </a:p>
+        </p:txBody>
+      </p:sp>
     </p:spTree>
     <p:extLst>
       <p:ext uri="{BB962C8B-B14F-4D97-AF65-F5344CB8AC3E}">
-        <p14:creationId xmlns:p14="http://schemas.microsoft.com/office/powerpoint/2010/main" val="871341481"/>
+        <p14:creationId xmlns:p14="http://schemas.microsoft.com/office/powerpoint/2010/main" val="2832160107"/>
       </p:ext>
     </p:extLst>
   </p:cSld>
   <p:clrMapOvr>
     <a:masterClrMapping/>
   </p:clrMapOvr>
+  <p:transition xmlns:p14="http://schemas.microsoft.com/office/powerpoint/2010/main" spd="slow">
+    <p:push dir="u"/>
+  </p:transition>
+  <p:timing>
+    <p:tnLst>
+      <p:par>
+        <p:cTn xmlns:p14="http://schemas.microsoft.com/office/powerpoint/2010/main" id="1" dur="indefinite" restart="never" nodeType="tmRoot"/>
+      </p:par>
+    </p:tnLst>
+  </p:timing>
 </p:sld>
 </file>
 

</xml_diff>